<commit_message>
added a video and updated a presentation
</commit_message>
<xml_diff>
--- a/lesson 7/Lesson_7.pptx
+++ b/lesson 7/Lesson_7.pptx
@@ -5,7 +5,7 @@
     <p:sldMasterId id="2147483648" r:id="rId1"/>
   </p:sldMasterIdLst>
   <p:notesMasterIdLst>
-    <p:notesMasterId r:id="rId18"/>
+    <p:notesMasterId r:id="rId12"/>
   </p:notesMasterIdLst>
   <p:sldIdLst>
     <p:sldId id="256" r:id="rId2"/>
@@ -17,13 +17,7 @@
     <p:sldId id="289" r:id="rId8"/>
     <p:sldId id="290" r:id="rId9"/>
     <p:sldId id="291" r:id="rId10"/>
-    <p:sldId id="274" r:id="rId11"/>
-    <p:sldId id="283" r:id="rId12"/>
-    <p:sldId id="282" r:id="rId13"/>
-    <p:sldId id="266" r:id="rId14"/>
-    <p:sldId id="276" r:id="rId15"/>
-    <p:sldId id="265" r:id="rId16"/>
-    <p:sldId id="284" r:id="rId17"/>
+    <p:sldId id="284" r:id="rId11"/>
   </p:sldIdLst>
   <p:sldSz cx="12192000" cy="6858000"/>
   <p:notesSz cx="6858000" cy="9144000"/>
@@ -144,6 +138,7 @@
     <p1510:client id="{C89ACF45-C2F8-E76F-58EF-8272F11558CB}" v="235" dt="2021-12-02T10:05:05.975"/>
     <p1510:client id="{E143B352-6C6B-8238-531D-573B4674CE9C}" v="2349" dt="2021-12-07T09:23:16.743"/>
     <p1510:client id="{EFCDE790-F7A8-3349-1351-42796E12D893}" v="2512" dt="2021-12-17T11:19:57.635"/>
+    <p1510:client id="{F0997DAC-AB05-AC6A-0F70-E9C2083FACC0}" v="6" dt="2021-12-18T05:34:09.760"/>
   </p1510:revLst>
 </p1510:revInfo>
 </file>
@@ -4609,4533 +4604,6 @@
 </file>
 
 <file path=ppt/slides/slide10.xml><?xml version="1.0" encoding="utf-8"?>
-<p:sld xmlns:a="http://schemas.openxmlformats.org/drawingml/2006/main" xmlns:r="http://schemas.openxmlformats.org/officeDocument/2006/relationships" xmlns:p="http://schemas.openxmlformats.org/presentationml/2006/main">
-  <p:cSld>
-    <p:spTree>
-      <p:nvGrpSpPr>
-        <p:cNvPr id="1" name=""/>
-        <p:cNvGrpSpPr/>
-        <p:nvPr/>
-      </p:nvGrpSpPr>
-      <p:grpSpPr>
-        <a:xfrm>
-          <a:off x="0" y="0"/>
-          <a:ext cx="0" cy="0"/>
-          <a:chOff x="0" y="0"/>
-          <a:chExt cx="0" cy="0"/>
-        </a:xfrm>
-      </p:grpSpPr>
-      <p:sp>
-        <p:nvSpPr>
-          <p:cNvPr id="3" name="Прямоугольник 4">
-            <a:extLst>
-              <a:ext uri="{FF2B5EF4-FFF2-40B4-BE49-F238E27FC236}">
-                <a16:creationId xmlns:a16="http://schemas.microsoft.com/office/drawing/2014/main" id="{36CC0B9C-0EBE-4A1E-B58D-B636BD15693B}"/>
-              </a:ext>
-            </a:extLst>
-          </p:cNvPr>
-          <p:cNvSpPr/>
-          <p:nvPr/>
-        </p:nvSpPr>
-        <p:spPr>
-          <a:xfrm>
-            <a:off x="569167" y="242596"/>
-            <a:ext cx="11150082" cy="811763"/>
-          </a:xfrm>
-          <a:prstGeom prst="rect">
-            <a:avLst/>
-          </a:prstGeom>
-        </p:spPr>
-        <p:style>
-          <a:lnRef idx="2">
-            <a:schemeClr val="accent1">
-              <a:shade val="50000"/>
-            </a:schemeClr>
-          </a:lnRef>
-          <a:fillRef idx="1">
-            <a:schemeClr val="accent1"/>
-          </a:fillRef>
-          <a:effectRef idx="0">
-            <a:schemeClr val="accent1"/>
-          </a:effectRef>
-          <a:fontRef idx="minor">
-            <a:schemeClr val="lt1"/>
-          </a:fontRef>
-        </p:style>
-        <p:txBody>
-          <a:bodyPr lIns="91440" tIns="45720" rIns="91440" bIns="45720" rtlCol="0" anchor="ctr"/>
-          <a:lstStyle/>
-          <a:p>
-            <a:pPr algn="ctr"/>
-            <a:r>
-              <a:rPr lang="ru-RU" sz="3200" b="1" dirty="0">
-                <a:ln w="12700" cmpd="sng">
-                  <a:solidFill>
-                    <a:srgbClr val="FFC000"/>
-                  </a:solidFill>
-                  <a:prstDash val="solid"/>
-                </a:ln>
-                <a:solidFill>
-                  <a:srgbClr val="FFC000"/>
-                </a:solidFill>
-                <a:ea typeface="+mn-lt"/>
-                <a:cs typeface="+mn-lt"/>
-              </a:rPr>
-              <a:t>Наследование</a:t>
-            </a:r>
-            <a:endParaRPr lang="en-US" dirty="0">
-              <a:cs typeface="Calibri"/>
-            </a:endParaRPr>
-          </a:p>
-        </p:txBody>
-      </p:sp>
-      <p:sp>
-        <p:nvSpPr>
-          <p:cNvPr id="2" name="Rectangle 1">
-            <a:extLst>
-              <a:ext uri="{FF2B5EF4-FFF2-40B4-BE49-F238E27FC236}">
-                <a16:creationId xmlns:a16="http://schemas.microsoft.com/office/drawing/2014/main" id="{9271947B-9B3F-4ACF-8C66-E53BAB505B8C}"/>
-              </a:ext>
-            </a:extLst>
-          </p:cNvPr>
-          <p:cNvSpPr/>
-          <p:nvPr/>
-        </p:nvSpPr>
-        <p:spPr>
-          <a:xfrm>
-            <a:off x="959336" y="1594337"/>
-            <a:ext cx="3849076" cy="654538"/>
-          </a:xfrm>
-          <a:prstGeom prst="rect">
-            <a:avLst/>
-          </a:prstGeom>
-        </p:spPr>
-        <p:style>
-          <a:lnRef idx="2">
-            <a:schemeClr val="accent1">
-              <a:shade val="50000"/>
-            </a:schemeClr>
-          </a:lnRef>
-          <a:fillRef idx="1">
-            <a:schemeClr val="accent1"/>
-          </a:fillRef>
-          <a:effectRef idx="0">
-            <a:schemeClr val="accent1"/>
-          </a:effectRef>
-          <a:fontRef idx="minor">
-            <a:schemeClr val="lt1"/>
-          </a:fontRef>
-        </p:style>
-        <p:txBody>
-          <a:bodyPr rtlCol="0" anchor="ctr"/>
-          <a:lstStyle/>
-          <a:p>
-            <a:pPr algn="ctr"/>
-            <a:r>
-              <a:rPr lang="en-US" b="1" dirty="0" err="1">
-                <a:solidFill>
-                  <a:schemeClr val="accent4"/>
-                </a:solidFill>
-                <a:cs typeface="Calibri"/>
-              </a:rPr>
-              <a:t>Класс</a:t>
-            </a:r>
-            <a:r>
-              <a:rPr lang="en-US" b="1" dirty="0">
-                <a:solidFill>
-                  <a:schemeClr val="accent4"/>
-                </a:solidFill>
-                <a:cs typeface="Calibri"/>
-              </a:rPr>
-              <a:t> </a:t>
-            </a:r>
-            <a:r>
-              <a:rPr lang="en-US" b="1" dirty="0" err="1">
-                <a:solidFill>
-                  <a:schemeClr val="accent4"/>
-                </a:solidFill>
-                <a:cs typeface="Calibri"/>
-              </a:rPr>
-              <a:t>родитель</a:t>
-            </a:r>
-            <a:r>
-              <a:rPr lang="en-US" b="1" dirty="0">
-                <a:solidFill>
-                  <a:schemeClr val="accent4"/>
-                </a:solidFill>
-                <a:cs typeface="Calibri"/>
-              </a:rPr>
-              <a:t> - Satellite</a:t>
-            </a:r>
-          </a:p>
-        </p:txBody>
-      </p:sp>
-      <p:sp>
-        <p:nvSpPr>
-          <p:cNvPr id="6" name="Rectangle 5">
-            <a:extLst>
-              <a:ext uri="{FF2B5EF4-FFF2-40B4-BE49-F238E27FC236}">
-                <a16:creationId xmlns:a16="http://schemas.microsoft.com/office/drawing/2014/main" id="{EED9DA5C-C1D4-4374-ADCB-14622BE0B820}"/>
-              </a:ext>
-            </a:extLst>
-          </p:cNvPr>
-          <p:cNvSpPr/>
-          <p:nvPr/>
-        </p:nvSpPr>
-        <p:spPr>
-          <a:xfrm>
-            <a:off x="7553567" y="1594337"/>
-            <a:ext cx="3849076" cy="635000"/>
-          </a:xfrm>
-          <a:prstGeom prst="rect">
-            <a:avLst/>
-          </a:prstGeom>
-        </p:spPr>
-        <p:style>
-          <a:lnRef idx="2">
-            <a:schemeClr val="accent1">
-              <a:shade val="50000"/>
-            </a:schemeClr>
-          </a:lnRef>
-          <a:fillRef idx="1">
-            <a:schemeClr val="accent1"/>
-          </a:fillRef>
-          <a:effectRef idx="0">
-            <a:schemeClr val="accent1"/>
-          </a:effectRef>
-          <a:fontRef idx="minor">
-            <a:schemeClr val="lt1"/>
-          </a:fontRef>
-        </p:style>
-        <p:txBody>
-          <a:bodyPr lIns="91440" tIns="45720" rIns="91440" bIns="45720" rtlCol="0" anchor="ctr"/>
-          <a:lstStyle/>
-          <a:p>
-            <a:pPr algn="ctr"/>
-            <a:r>
-              <a:rPr lang="en-US" b="1" dirty="0" err="1">
-                <a:solidFill>
-                  <a:schemeClr val="accent4"/>
-                </a:solidFill>
-                <a:cs typeface="Calibri"/>
-              </a:rPr>
-              <a:t>Класс</a:t>
-            </a:r>
-            <a:r>
-              <a:rPr lang="en-US" b="1" dirty="0">
-                <a:solidFill>
-                  <a:schemeClr val="accent4"/>
-                </a:solidFill>
-                <a:cs typeface="Calibri"/>
-              </a:rPr>
-              <a:t> </a:t>
-            </a:r>
-            <a:r>
-              <a:rPr lang="en-US" b="1" dirty="0" err="1">
-                <a:solidFill>
-                  <a:schemeClr val="accent4"/>
-                </a:solidFill>
-                <a:cs typeface="Calibri"/>
-              </a:rPr>
-              <a:t>наследник</a:t>
-            </a:r>
-            <a:r>
-              <a:rPr lang="en-US" b="1" dirty="0">
-                <a:solidFill>
-                  <a:schemeClr val="accent4"/>
-                </a:solidFill>
-                <a:cs typeface="Calibri"/>
-              </a:rPr>
-              <a:t> - </a:t>
-            </a:r>
-            <a:r>
-              <a:rPr lang="en-US" b="1" dirty="0" err="1">
-                <a:solidFill>
-                  <a:schemeClr val="accent4"/>
-                </a:solidFill>
-                <a:cs typeface="Calibri"/>
-              </a:rPr>
-              <a:t>NanoSatellite</a:t>
-            </a:r>
-          </a:p>
-        </p:txBody>
-      </p:sp>
-      <p:pic>
-        <p:nvPicPr>
-          <p:cNvPr id="9" name="Picture 9">
-            <a:extLst>
-              <a:ext uri="{FF2B5EF4-FFF2-40B4-BE49-F238E27FC236}">
-                <a16:creationId xmlns:a16="http://schemas.microsoft.com/office/drawing/2014/main" id="{4AD0673B-C7F6-4264-9F95-FE67AF5ED815}"/>
-              </a:ext>
-            </a:extLst>
-          </p:cNvPr>
-          <p:cNvPicPr>
-            <a:picLocks noChangeAspect="1"/>
-          </p:cNvPicPr>
-          <p:nvPr/>
-        </p:nvPicPr>
-        <p:blipFill>
-          <a:blip r:embed="rId2"/>
-          <a:stretch>
-            <a:fillRect/>
-          </a:stretch>
-        </p:blipFill>
-        <p:spPr>
-          <a:xfrm>
-            <a:off x="885093" y="2462436"/>
-            <a:ext cx="3827583" cy="4199588"/>
-          </a:xfrm>
-          <a:prstGeom prst="rect">
-            <a:avLst/>
-          </a:prstGeom>
-        </p:spPr>
-      </p:pic>
-      <p:pic>
-        <p:nvPicPr>
-          <p:cNvPr id="10" name="Picture 10">
-            <a:extLst>
-              <a:ext uri="{FF2B5EF4-FFF2-40B4-BE49-F238E27FC236}">
-                <a16:creationId xmlns:a16="http://schemas.microsoft.com/office/drawing/2014/main" id="{BF4FEE4D-9467-4C43-AA82-D650B0116884}"/>
-              </a:ext>
-            </a:extLst>
-          </p:cNvPr>
-          <p:cNvPicPr>
-            <a:picLocks noChangeAspect="1"/>
-          </p:cNvPicPr>
-          <p:nvPr/>
-        </p:nvPicPr>
-        <p:blipFill>
-          <a:blip r:embed="rId3"/>
-          <a:stretch>
-            <a:fillRect/>
-          </a:stretch>
-        </p:blipFill>
-        <p:spPr>
-          <a:xfrm>
-            <a:off x="7743092" y="2459953"/>
-            <a:ext cx="4022968" cy="2240939"/>
-          </a:xfrm>
-          <a:prstGeom prst="rect">
-            <a:avLst/>
-          </a:prstGeom>
-        </p:spPr>
-      </p:pic>
-      <p:sp>
-        <p:nvSpPr>
-          <p:cNvPr id="11" name="Arrow: Right 10">
-            <a:extLst>
-              <a:ext uri="{FF2B5EF4-FFF2-40B4-BE49-F238E27FC236}">
-                <a16:creationId xmlns:a16="http://schemas.microsoft.com/office/drawing/2014/main" id="{E9077B00-FA74-4548-8671-55C74CA7FF0A}"/>
-              </a:ext>
-            </a:extLst>
-          </p:cNvPr>
-          <p:cNvSpPr/>
-          <p:nvPr/>
-        </p:nvSpPr>
-        <p:spPr>
-          <a:xfrm>
-            <a:off x="5759439" y="3007173"/>
-            <a:ext cx="976923" cy="488461"/>
-          </a:xfrm>
-          <a:prstGeom prst="rightArrow">
-            <a:avLst/>
-          </a:prstGeom>
-          <a:solidFill>
-            <a:schemeClr val="accent4"/>
-          </a:solidFill>
-        </p:spPr>
-        <p:style>
-          <a:lnRef idx="2">
-            <a:schemeClr val="accent1">
-              <a:shade val="50000"/>
-            </a:schemeClr>
-          </a:lnRef>
-          <a:fillRef idx="1">
-            <a:schemeClr val="accent1"/>
-          </a:fillRef>
-          <a:effectRef idx="0">
-            <a:schemeClr val="accent1"/>
-          </a:effectRef>
-          <a:fontRef idx="minor">
-            <a:schemeClr val="lt1"/>
-          </a:fontRef>
-        </p:style>
-        <p:txBody>
-          <a:bodyPr rtlCol="0" anchor="ctr"/>
-          <a:lstStyle/>
-          <a:p>
-            <a:pPr algn="ctr"/>
-            <a:endParaRPr lang="en-US"/>
-          </a:p>
-        </p:txBody>
-      </p:sp>
-      <p:sp>
-        <p:nvSpPr>
-          <p:cNvPr id="12" name="TextBox 11">
-            <a:extLst>
-              <a:ext uri="{FF2B5EF4-FFF2-40B4-BE49-F238E27FC236}">
-                <a16:creationId xmlns:a16="http://schemas.microsoft.com/office/drawing/2014/main" id="{02825A65-A656-4F25-AD79-820CE4F73F8D}"/>
-              </a:ext>
-            </a:extLst>
-          </p:cNvPr>
-          <p:cNvSpPr txBox="1"/>
-          <p:nvPr/>
-        </p:nvSpPr>
-        <p:spPr>
-          <a:xfrm>
-            <a:off x="4931996" y="3720612"/>
-            <a:ext cx="3280506" cy="1200329"/>
-          </a:xfrm>
-          <a:prstGeom prst="rect">
-            <a:avLst/>
-          </a:prstGeom>
-          <a:noFill/>
-        </p:spPr>
-        <p:txBody>
-          <a:bodyPr rot="0" spcFirstLastPara="0" vertOverflow="overflow" horzOverflow="overflow" vert="horz" wrap="square" lIns="91440" tIns="45720" rIns="91440" bIns="45720" numCol="1" spcCol="0" rtlCol="0" fromWordArt="0" anchor="t" anchorCtr="0" forceAA="0" compatLnSpc="1">
-            <a:prstTxWarp prst="textNoShape">
-              <a:avLst/>
-            </a:prstTxWarp>
-            <a:spAutoFit/>
-          </a:bodyPr>
-          <a:lstStyle/>
-          <a:p>
-            <a:r>
-              <a:rPr lang="en-US" dirty="0"/>
-              <a:t>    </a:t>
-            </a:r>
-            <a:r>
-              <a:rPr lang="en-US" dirty="0" err="1"/>
-              <a:t>Все</a:t>
-            </a:r>
-            <a:r>
-              <a:rPr lang="en-US" dirty="0"/>
-              <a:t> </a:t>
-            </a:r>
-            <a:r>
-              <a:rPr lang="en-US" dirty="0" err="1"/>
-              <a:t>атрибуты</a:t>
-            </a:r>
-            <a:r>
-              <a:rPr lang="en-US" dirty="0"/>
-              <a:t> и </a:t>
-            </a:r>
-            <a:r>
-              <a:rPr lang="en-US" dirty="0" err="1"/>
-              <a:t>методы</a:t>
-            </a:r>
-            <a:r>
-              <a:rPr lang="en-US" dirty="0"/>
-              <a:t> </a:t>
-            </a:r>
-            <a:r>
-              <a:rPr lang="en-US" dirty="0" err="1"/>
-              <a:t>наследуются</a:t>
-            </a:r>
-            <a:r>
-              <a:rPr lang="en-US" dirty="0"/>
-              <a:t> и </a:t>
-            </a:r>
-            <a:r>
-              <a:rPr lang="en-US" dirty="0" err="1"/>
-              <a:t>могут</a:t>
-            </a:r>
-            <a:r>
-              <a:rPr lang="en-US" dirty="0"/>
-              <a:t> </a:t>
-            </a:r>
-            <a:r>
-              <a:rPr lang="en-US" dirty="0" err="1"/>
-              <a:t>быть</a:t>
-            </a:r>
-            <a:r>
-              <a:rPr lang="en-US" dirty="0"/>
-              <a:t> </a:t>
-            </a:r>
-            <a:r>
-              <a:rPr lang="en-US" dirty="0" err="1"/>
-              <a:t>использованы</a:t>
-            </a:r>
-            <a:r>
-              <a:rPr lang="en-US" dirty="0"/>
-              <a:t> в </a:t>
-            </a:r>
-            <a:r>
-              <a:rPr lang="en-US" dirty="0" err="1"/>
-              <a:t>классе</a:t>
-            </a:r>
-            <a:r>
-              <a:rPr lang="en-US" dirty="0"/>
-              <a:t> </a:t>
-            </a:r>
-            <a:r>
-              <a:rPr lang="en-US" dirty="0" err="1"/>
-              <a:t>наследнике</a:t>
-            </a:r>
-            <a:endParaRPr lang="en-US" dirty="0" err="1">
-              <a:cs typeface="Calibri"/>
-            </a:endParaRPr>
-          </a:p>
-        </p:txBody>
-      </p:sp>
-    </p:spTree>
-    <p:extLst>
-      <p:ext uri="{BB962C8B-B14F-4D97-AF65-F5344CB8AC3E}">
-        <p14:creationId xmlns:p14="http://schemas.microsoft.com/office/powerpoint/2010/main" val="3666564438"/>
-      </p:ext>
-    </p:extLst>
-  </p:cSld>
-  <p:clrMapOvr>
-    <a:masterClrMapping/>
-  </p:clrMapOvr>
-</p:sld>
-</file>
-
-<file path=ppt/slides/slide11.xml><?xml version="1.0" encoding="utf-8"?>
-<p:sld xmlns:a="http://schemas.openxmlformats.org/drawingml/2006/main" xmlns:r="http://schemas.openxmlformats.org/officeDocument/2006/relationships" xmlns:p="http://schemas.openxmlformats.org/presentationml/2006/main">
-  <p:cSld>
-    <p:spTree>
-      <p:nvGrpSpPr>
-        <p:cNvPr id="1" name=""/>
-        <p:cNvGrpSpPr/>
-        <p:nvPr/>
-      </p:nvGrpSpPr>
-      <p:grpSpPr>
-        <a:xfrm>
-          <a:off x="0" y="0"/>
-          <a:ext cx="0" cy="0"/>
-          <a:chOff x="0" y="0"/>
-          <a:chExt cx="0" cy="0"/>
-        </a:xfrm>
-      </p:grpSpPr>
-      <p:sp>
-        <p:nvSpPr>
-          <p:cNvPr id="6" name="Rectangle: Rounded Corners 5">
-            <a:extLst>
-              <a:ext uri="{FF2B5EF4-FFF2-40B4-BE49-F238E27FC236}">
-                <a16:creationId xmlns:a16="http://schemas.microsoft.com/office/drawing/2014/main" id="{0F80EDA8-1C6C-4CC4-9A1E-18CE918DFDD0}"/>
-              </a:ext>
-            </a:extLst>
-          </p:cNvPr>
-          <p:cNvSpPr/>
-          <p:nvPr/>
-        </p:nvSpPr>
-        <p:spPr>
-          <a:xfrm>
-            <a:off x="6811107" y="1525953"/>
-            <a:ext cx="4972537" cy="2276230"/>
-          </a:xfrm>
-          <a:prstGeom prst="roundRect">
-            <a:avLst/>
-          </a:prstGeom>
-        </p:spPr>
-        <p:style>
-          <a:lnRef idx="2">
-            <a:schemeClr val="accent1">
-              <a:shade val="50000"/>
-            </a:schemeClr>
-          </a:lnRef>
-          <a:fillRef idx="1">
-            <a:schemeClr val="accent1"/>
-          </a:fillRef>
-          <a:effectRef idx="0">
-            <a:schemeClr val="accent1"/>
-          </a:effectRef>
-          <a:fontRef idx="minor">
-            <a:schemeClr val="lt1"/>
-          </a:fontRef>
-        </p:style>
-        <p:txBody>
-          <a:bodyPr rtlCol="0" anchor="ctr"/>
-          <a:lstStyle/>
-          <a:p>
-            <a:r>
-              <a:rPr lang="en-US" dirty="0">
-                <a:solidFill>
-                  <a:schemeClr val="accent4"/>
-                </a:solidFill>
-                <a:ea typeface="+mn-lt"/>
-                <a:cs typeface="+mn-lt"/>
-              </a:rPr>
-              <a:t>        </a:t>
-            </a:r>
-            <a:r>
-              <a:rPr lang="en-US" dirty="0" err="1">
-                <a:solidFill>
-                  <a:schemeClr val="accent4"/>
-                </a:solidFill>
-                <a:ea typeface="+mn-lt"/>
-                <a:cs typeface="+mn-lt"/>
-              </a:rPr>
-              <a:t>Переме</a:t>
-            </a:r>
-            <a:r>
-              <a:rPr lang="en-US" dirty="0" err="1">
-                <a:solidFill>
-                  <a:schemeClr val="accent4"/>
-                </a:solidFill>
-              </a:rPr>
-              <a:t>нные</a:t>
-            </a:r>
-            <a:r>
-              <a:rPr lang="en-US" dirty="0">
-                <a:solidFill>
-                  <a:schemeClr val="accent4"/>
-                </a:solidFill>
-              </a:rPr>
-              <a:t> </a:t>
-            </a:r>
-            <a:r>
-              <a:rPr lang="en-US" dirty="0" err="1">
-                <a:solidFill>
-                  <a:schemeClr val="accent4"/>
-                </a:solidFill>
-              </a:rPr>
-              <a:t>кла</a:t>
-            </a:r>
-            <a:r>
-              <a:rPr lang="en-US" dirty="0" err="1">
-                <a:solidFill>
-                  <a:schemeClr val="accent4"/>
-                </a:solidFill>
-                <a:ea typeface="+mn-lt"/>
-                <a:cs typeface="+mn-lt"/>
-              </a:rPr>
-              <a:t>сса</a:t>
-            </a:r>
-            <a:r>
-              <a:rPr lang="en-US" dirty="0">
-                <a:ea typeface="+mn-lt"/>
-                <a:cs typeface="+mn-lt"/>
-              </a:rPr>
-              <a:t> </a:t>
-            </a:r>
-            <a:r>
-              <a:rPr lang="en-US" dirty="0" err="1">
-                <a:ea typeface="+mn-lt"/>
-                <a:cs typeface="+mn-lt"/>
-              </a:rPr>
-              <a:t>разделяемы</a:t>
-            </a:r>
-            <a:r>
-              <a:rPr lang="en-US" dirty="0">
-                <a:ea typeface="+mn-lt"/>
-                <a:cs typeface="+mn-lt"/>
-              </a:rPr>
-              <a:t> – </a:t>
-            </a:r>
-            <a:r>
-              <a:rPr lang="en-US" dirty="0" err="1">
-                <a:ea typeface="+mn-lt"/>
-                <a:cs typeface="+mn-lt"/>
-              </a:rPr>
-              <a:t>доступ</a:t>
-            </a:r>
-            <a:r>
-              <a:rPr lang="en-US" dirty="0">
-                <a:ea typeface="+mn-lt"/>
-                <a:cs typeface="+mn-lt"/>
-              </a:rPr>
-              <a:t> к </a:t>
-            </a:r>
-            <a:r>
-              <a:rPr lang="en-US" dirty="0" err="1">
-                <a:ea typeface="+mn-lt"/>
-                <a:cs typeface="+mn-lt"/>
-              </a:rPr>
-              <a:t>ним</a:t>
-            </a:r>
-            <a:r>
-              <a:rPr lang="en-US" dirty="0">
-                <a:ea typeface="+mn-lt"/>
-                <a:cs typeface="+mn-lt"/>
-              </a:rPr>
-              <a:t> </a:t>
-            </a:r>
-            <a:r>
-              <a:rPr lang="en-US" dirty="0" err="1">
-                <a:ea typeface="+mn-lt"/>
-                <a:cs typeface="+mn-lt"/>
-              </a:rPr>
-              <a:t>могут</a:t>
-            </a:r>
-            <a:r>
-              <a:rPr lang="en-US" dirty="0">
-                <a:ea typeface="+mn-lt"/>
-                <a:cs typeface="+mn-lt"/>
-              </a:rPr>
-              <a:t> </a:t>
-            </a:r>
-            <a:r>
-              <a:rPr lang="en-US" dirty="0" err="1">
-                <a:ea typeface="+mn-lt"/>
-                <a:cs typeface="+mn-lt"/>
-              </a:rPr>
-              <a:t>получать</a:t>
-            </a:r>
-            <a:r>
-              <a:rPr lang="en-US" dirty="0">
-                <a:ea typeface="+mn-lt"/>
-                <a:cs typeface="+mn-lt"/>
-              </a:rPr>
-              <a:t> </a:t>
-            </a:r>
-            <a:r>
-              <a:rPr lang="en-US" dirty="0" err="1">
-                <a:ea typeface="+mn-lt"/>
-                <a:cs typeface="+mn-lt"/>
-              </a:rPr>
-              <a:t>все</a:t>
-            </a:r>
-            <a:r>
-              <a:rPr lang="en-US" dirty="0">
-                <a:ea typeface="+mn-lt"/>
-                <a:cs typeface="+mn-lt"/>
-              </a:rPr>
-              <a:t> </a:t>
-            </a:r>
-            <a:r>
-              <a:rPr lang="en-US" dirty="0" err="1">
-                <a:ea typeface="+mn-lt"/>
-                <a:cs typeface="+mn-lt"/>
-              </a:rPr>
-              <a:t>экземпляры</a:t>
-            </a:r>
-            <a:r>
-              <a:rPr lang="en-US" dirty="0">
-                <a:ea typeface="+mn-lt"/>
-                <a:cs typeface="+mn-lt"/>
-              </a:rPr>
-              <a:t> </a:t>
-            </a:r>
-            <a:r>
-              <a:rPr lang="en-US" dirty="0" err="1">
-                <a:ea typeface="+mn-lt"/>
-                <a:cs typeface="+mn-lt"/>
-              </a:rPr>
-              <a:t>этого</a:t>
-            </a:r>
-            <a:r>
-              <a:rPr lang="en-US" dirty="0">
-                <a:ea typeface="+mn-lt"/>
-                <a:cs typeface="+mn-lt"/>
-              </a:rPr>
-              <a:t> </a:t>
-            </a:r>
-            <a:r>
-              <a:rPr lang="en-US" dirty="0" err="1">
-                <a:ea typeface="+mn-lt"/>
-                <a:cs typeface="+mn-lt"/>
-              </a:rPr>
-              <a:t>класса</a:t>
-            </a:r>
-            <a:r>
-              <a:rPr lang="en-US" dirty="0">
-                <a:ea typeface="+mn-lt"/>
-                <a:cs typeface="+mn-lt"/>
-              </a:rPr>
-              <a:t>. </a:t>
-            </a:r>
-            <a:r>
-              <a:rPr lang="en-US" dirty="0" err="1">
-                <a:ea typeface="+mn-lt"/>
-                <a:cs typeface="+mn-lt"/>
-              </a:rPr>
-              <a:t>Переменная</a:t>
-            </a:r>
-            <a:r>
-              <a:rPr lang="en-US" dirty="0">
-                <a:ea typeface="+mn-lt"/>
-                <a:cs typeface="+mn-lt"/>
-              </a:rPr>
-              <a:t> </a:t>
-            </a:r>
-            <a:r>
-              <a:rPr lang="en-US" dirty="0" err="1">
-                <a:ea typeface="+mn-lt"/>
-                <a:cs typeface="+mn-lt"/>
-              </a:rPr>
-              <a:t>класса</a:t>
-            </a:r>
-            <a:r>
-              <a:rPr lang="en-US" dirty="0">
-                <a:ea typeface="+mn-lt"/>
-                <a:cs typeface="+mn-lt"/>
-              </a:rPr>
-              <a:t> </a:t>
-            </a:r>
-            <a:r>
-              <a:rPr lang="en-US" dirty="0" err="1">
-                <a:ea typeface="+mn-lt"/>
-                <a:cs typeface="+mn-lt"/>
-              </a:rPr>
-              <a:t>существует</a:t>
-            </a:r>
-            <a:r>
-              <a:rPr lang="en-US" dirty="0">
-                <a:ea typeface="+mn-lt"/>
-                <a:cs typeface="+mn-lt"/>
-              </a:rPr>
-              <a:t> </a:t>
-            </a:r>
-            <a:r>
-              <a:rPr lang="en-US" dirty="0" err="1">
-                <a:ea typeface="+mn-lt"/>
-                <a:cs typeface="+mn-lt"/>
-              </a:rPr>
-              <a:t>только</a:t>
-            </a:r>
-            <a:r>
-              <a:rPr lang="en-US" dirty="0">
-                <a:ea typeface="+mn-lt"/>
-                <a:cs typeface="+mn-lt"/>
-              </a:rPr>
-              <a:t> </a:t>
-            </a:r>
-            <a:r>
-              <a:rPr lang="en-US" dirty="0" err="1">
-                <a:ea typeface="+mn-lt"/>
-                <a:cs typeface="+mn-lt"/>
-              </a:rPr>
-              <a:t>одна</a:t>
-            </a:r>
-            <a:r>
-              <a:rPr lang="en-US" dirty="0">
-                <a:ea typeface="+mn-lt"/>
-                <a:cs typeface="+mn-lt"/>
-              </a:rPr>
-              <a:t>, </a:t>
-            </a:r>
-            <a:r>
-              <a:rPr lang="en-US" dirty="0" err="1">
-                <a:ea typeface="+mn-lt"/>
-                <a:cs typeface="+mn-lt"/>
-              </a:rPr>
-              <a:t>поэтому</a:t>
-            </a:r>
-            <a:r>
-              <a:rPr lang="en-US" dirty="0">
-                <a:ea typeface="+mn-lt"/>
-                <a:cs typeface="+mn-lt"/>
-              </a:rPr>
-              <a:t> </a:t>
-            </a:r>
-            <a:r>
-              <a:rPr lang="en-US" dirty="0" err="1">
-                <a:ea typeface="+mn-lt"/>
-                <a:cs typeface="+mn-lt"/>
-              </a:rPr>
-              <a:t>когда</a:t>
-            </a:r>
-            <a:r>
-              <a:rPr lang="en-US" dirty="0">
-                <a:ea typeface="+mn-lt"/>
-                <a:cs typeface="+mn-lt"/>
-              </a:rPr>
-              <a:t> </a:t>
-            </a:r>
-            <a:r>
-              <a:rPr lang="en-US" dirty="0" err="1">
-                <a:ea typeface="+mn-lt"/>
-                <a:cs typeface="+mn-lt"/>
-              </a:rPr>
-              <a:t>любой</a:t>
-            </a:r>
-            <a:r>
-              <a:rPr lang="en-US" dirty="0">
-                <a:ea typeface="+mn-lt"/>
-                <a:cs typeface="+mn-lt"/>
-              </a:rPr>
-              <a:t> </a:t>
-            </a:r>
-            <a:r>
-              <a:rPr lang="en-US" dirty="0" err="1">
-                <a:ea typeface="+mn-lt"/>
-                <a:cs typeface="+mn-lt"/>
-              </a:rPr>
-              <a:t>из</a:t>
-            </a:r>
-            <a:r>
-              <a:rPr lang="en-US" dirty="0">
-                <a:ea typeface="+mn-lt"/>
-                <a:cs typeface="+mn-lt"/>
-              </a:rPr>
-              <a:t> </a:t>
-            </a:r>
-            <a:r>
-              <a:rPr lang="en-US" dirty="0" err="1">
-                <a:ea typeface="+mn-lt"/>
-                <a:cs typeface="+mn-lt"/>
-              </a:rPr>
-              <a:t>объект-ов</a:t>
-            </a:r>
-            <a:r>
-              <a:rPr lang="en-US" dirty="0">
-                <a:ea typeface="+mn-lt"/>
-                <a:cs typeface="+mn-lt"/>
-              </a:rPr>
-              <a:t> </a:t>
-            </a:r>
-            <a:r>
-              <a:rPr lang="en-US" dirty="0" err="1">
-                <a:ea typeface="+mn-lt"/>
-                <a:cs typeface="+mn-lt"/>
-              </a:rPr>
-              <a:t>изменяет</a:t>
-            </a:r>
-            <a:r>
-              <a:rPr lang="en-US" dirty="0">
-                <a:ea typeface="+mn-lt"/>
-                <a:cs typeface="+mn-lt"/>
-              </a:rPr>
-              <a:t> </a:t>
-            </a:r>
-            <a:r>
-              <a:rPr lang="en-US" dirty="0" err="1">
-                <a:ea typeface="+mn-lt"/>
-                <a:cs typeface="+mn-lt"/>
-              </a:rPr>
-              <a:t>переменную</a:t>
-            </a:r>
-            <a:r>
-              <a:rPr lang="en-US" dirty="0">
-                <a:ea typeface="+mn-lt"/>
-                <a:cs typeface="+mn-lt"/>
-              </a:rPr>
-              <a:t> </a:t>
-            </a:r>
-            <a:r>
-              <a:rPr lang="en-US" dirty="0" err="1">
-                <a:ea typeface="+mn-lt"/>
-                <a:cs typeface="+mn-lt"/>
-              </a:rPr>
-              <a:t>класса</a:t>
-            </a:r>
-            <a:r>
-              <a:rPr lang="en-US" dirty="0">
-                <a:ea typeface="+mn-lt"/>
-                <a:cs typeface="+mn-lt"/>
-              </a:rPr>
-              <a:t>, </a:t>
-            </a:r>
-            <a:r>
-              <a:rPr lang="en-US" dirty="0" err="1">
-                <a:ea typeface="+mn-lt"/>
-                <a:cs typeface="+mn-lt"/>
-              </a:rPr>
-              <a:t>это</a:t>
-            </a:r>
-            <a:r>
-              <a:rPr lang="en-US" dirty="0">
-                <a:ea typeface="+mn-lt"/>
-                <a:cs typeface="+mn-lt"/>
-              </a:rPr>
-              <a:t> </a:t>
-            </a:r>
-            <a:r>
-              <a:rPr lang="en-US" dirty="0" err="1">
-                <a:ea typeface="+mn-lt"/>
-                <a:cs typeface="+mn-lt"/>
-              </a:rPr>
-              <a:t>изменение</a:t>
-            </a:r>
-            <a:r>
-              <a:rPr lang="en-US" dirty="0">
-                <a:ea typeface="+mn-lt"/>
-                <a:cs typeface="+mn-lt"/>
-              </a:rPr>
-              <a:t> </a:t>
-            </a:r>
-            <a:r>
-              <a:rPr lang="en-US" dirty="0" err="1">
-                <a:ea typeface="+mn-lt"/>
-                <a:cs typeface="+mn-lt"/>
-              </a:rPr>
-              <a:t>отразится</a:t>
-            </a:r>
-            <a:r>
-              <a:rPr lang="en-US" dirty="0">
-                <a:ea typeface="+mn-lt"/>
-                <a:cs typeface="+mn-lt"/>
-              </a:rPr>
-              <a:t> и </a:t>
-            </a:r>
-            <a:r>
-              <a:rPr lang="en-US" dirty="0" err="1">
-                <a:ea typeface="+mn-lt"/>
-                <a:cs typeface="+mn-lt"/>
-              </a:rPr>
-              <a:t>во</a:t>
-            </a:r>
-            <a:r>
-              <a:rPr lang="en-US" dirty="0">
-                <a:ea typeface="+mn-lt"/>
-                <a:cs typeface="+mn-lt"/>
-              </a:rPr>
-              <a:t> </a:t>
-            </a:r>
-            <a:r>
-              <a:rPr lang="en-US" dirty="0" err="1">
-                <a:ea typeface="+mn-lt"/>
-                <a:cs typeface="+mn-lt"/>
-              </a:rPr>
-              <a:t>всех</a:t>
-            </a:r>
-            <a:r>
-              <a:rPr lang="en-US" dirty="0">
-                <a:ea typeface="+mn-lt"/>
-                <a:cs typeface="+mn-lt"/>
-              </a:rPr>
-              <a:t> </a:t>
-            </a:r>
-            <a:r>
-              <a:rPr lang="en-US" dirty="0" err="1">
-                <a:ea typeface="+mn-lt"/>
-                <a:cs typeface="+mn-lt"/>
-              </a:rPr>
-              <a:t>остальных</a:t>
-            </a:r>
-            <a:r>
-              <a:rPr lang="en-US" dirty="0">
-                <a:ea typeface="+mn-lt"/>
-                <a:cs typeface="+mn-lt"/>
-              </a:rPr>
-              <a:t> </a:t>
-            </a:r>
-            <a:r>
-              <a:rPr lang="en-US" dirty="0" err="1">
-                <a:ea typeface="+mn-lt"/>
-                <a:cs typeface="+mn-lt"/>
-              </a:rPr>
-              <a:t>экземплярах</a:t>
-            </a:r>
-            <a:r>
-              <a:rPr lang="en-US" dirty="0">
-                <a:ea typeface="+mn-lt"/>
-                <a:cs typeface="+mn-lt"/>
-              </a:rPr>
-              <a:t> </a:t>
-            </a:r>
-            <a:r>
-              <a:rPr lang="en-US" dirty="0" err="1">
-                <a:ea typeface="+mn-lt"/>
-                <a:cs typeface="+mn-lt"/>
-              </a:rPr>
-              <a:t>того</a:t>
-            </a:r>
-            <a:r>
-              <a:rPr lang="en-US" dirty="0">
-                <a:ea typeface="+mn-lt"/>
-                <a:cs typeface="+mn-lt"/>
-              </a:rPr>
-              <a:t> </a:t>
-            </a:r>
-            <a:r>
-              <a:rPr lang="en-US" dirty="0" err="1">
-                <a:ea typeface="+mn-lt"/>
-                <a:cs typeface="+mn-lt"/>
-              </a:rPr>
-              <a:t>же</a:t>
-            </a:r>
-            <a:r>
-              <a:rPr lang="en-US" dirty="0">
-                <a:ea typeface="+mn-lt"/>
-                <a:cs typeface="+mn-lt"/>
-              </a:rPr>
-              <a:t> </a:t>
-            </a:r>
-            <a:r>
-              <a:rPr lang="en-US" dirty="0" err="1">
-                <a:ea typeface="+mn-lt"/>
-                <a:cs typeface="+mn-lt"/>
-              </a:rPr>
-              <a:t>класса</a:t>
-            </a:r>
-            <a:r>
-              <a:rPr lang="en-US" dirty="0">
-                <a:ea typeface="+mn-lt"/>
-                <a:cs typeface="+mn-lt"/>
-              </a:rPr>
-              <a:t>.</a:t>
-            </a:r>
-          </a:p>
-        </p:txBody>
-      </p:sp>
-      <p:sp>
-        <p:nvSpPr>
-          <p:cNvPr id="3" name="Прямоугольник 4">
-            <a:extLst>
-              <a:ext uri="{FF2B5EF4-FFF2-40B4-BE49-F238E27FC236}">
-                <a16:creationId xmlns:a16="http://schemas.microsoft.com/office/drawing/2014/main" id="{4E74651B-C9E9-46F0-961F-6E77A667B27D}"/>
-              </a:ext>
-            </a:extLst>
-          </p:cNvPr>
-          <p:cNvSpPr/>
-          <p:nvPr/>
-        </p:nvSpPr>
-        <p:spPr>
-          <a:xfrm>
-            <a:off x="569167" y="242596"/>
-            <a:ext cx="11150082" cy="811763"/>
-          </a:xfrm>
-          <a:prstGeom prst="rect">
-            <a:avLst/>
-          </a:prstGeom>
-        </p:spPr>
-        <p:style>
-          <a:lnRef idx="2">
-            <a:schemeClr val="accent1">
-              <a:shade val="50000"/>
-            </a:schemeClr>
-          </a:lnRef>
-          <a:fillRef idx="1">
-            <a:schemeClr val="accent1"/>
-          </a:fillRef>
-          <a:effectRef idx="0">
-            <a:schemeClr val="accent1"/>
-          </a:effectRef>
-          <a:fontRef idx="minor">
-            <a:schemeClr val="lt1"/>
-          </a:fontRef>
-        </p:style>
-        <p:txBody>
-          <a:bodyPr lIns="91440" tIns="45720" rIns="91440" bIns="45720" rtlCol="0" anchor="ctr"/>
-          <a:lstStyle/>
-          <a:p>
-            <a:pPr algn="ctr"/>
-            <a:r>
-              <a:rPr lang="ru-RU" sz="3200" b="1" dirty="0">
-                <a:ln w="12700" cmpd="sng">
-                  <a:solidFill>
-                    <a:srgbClr val="FFC000"/>
-                  </a:solidFill>
-                  <a:prstDash val="solid"/>
-                </a:ln>
-                <a:solidFill>
-                  <a:srgbClr val="FFC000"/>
-                </a:solidFill>
-                <a:cs typeface="Calibri"/>
-              </a:rPr>
-              <a:t>Переменные класса и объекта</a:t>
-            </a:r>
-          </a:p>
-        </p:txBody>
-      </p:sp>
-      <p:pic>
-        <p:nvPicPr>
-          <p:cNvPr id="4" name="Picture 4">
-            <a:extLst>
-              <a:ext uri="{FF2B5EF4-FFF2-40B4-BE49-F238E27FC236}">
-                <a16:creationId xmlns:a16="http://schemas.microsoft.com/office/drawing/2014/main" id="{CFC82174-534C-43B4-BF8B-5FF065FC8A74}"/>
-              </a:ext>
-            </a:extLst>
-          </p:cNvPr>
-          <p:cNvPicPr>
-            <a:picLocks noChangeAspect="1"/>
-          </p:cNvPicPr>
-          <p:nvPr/>
-        </p:nvPicPr>
-        <p:blipFill rotWithShape="1">
-          <a:blip r:embed="rId2"/>
-          <a:srcRect b="3654"/>
-          <a:stretch/>
-        </p:blipFill>
-        <p:spPr>
-          <a:xfrm>
-            <a:off x="966585" y="1123484"/>
-            <a:ext cx="4970584" cy="5595108"/>
-          </a:xfrm>
-          <a:prstGeom prst="rect">
-            <a:avLst/>
-          </a:prstGeom>
-        </p:spPr>
-      </p:pic>
-      <p:sp>
-        <p:nvSpPr>
-          <p:cNvPr id="7" name="Rectangle: Rounded Corners 6">
-            <a:extLst>
-              <a:ext uri="{FF2B5EF4-FFF2-40B4-BE49-F238E27FC236}">
-                <a16:creationId xmlns:a16="http://schemas.microsoft.com/office/drawing/2014/main" id="{FDDFA3F2-AF88-47F8-9B53-44119A76FFFE}"/>
-              </a:ext>
-            </a:extLst>
-          </p:cNvPr>
-          <p:cNvSpPr/>
-          <p:nvPr/>
-        </p:nvSpPr>
-        <p:spPr>
-          <a:xfrm>
-            <a:off x="6811107" y="4144106"/>
-            <a:ext cx="4972537" cy="2276230"/>
-          </a:xfrm>
-          <a:prstGeom prst="roundRect">
-            <a:avLst/>
-          </a:prstGeom>
-        </p:spPr>
-        <p:style>
-          <a:lnRef idx="2">
-            <a:schemeClr val="accent1">
-              <a:shade val="50000"/>
-            </a:schemeClr>
-          </a:lnRef>
-          <a:fillRef idx="1">
-            <a:schemeClr val="accent1"/>
-          </a:fillRef>
-          <a:effectRef idx="0">
-            <a:schemeClr val="accent1"/>
-          </a:effectRef>
-          <a:fontRef idx="minor">
-            <a:schemeClr val="lt1"/>
-          </a:fontRef>
-        </p:style>
-        <p:txBody>
-          <a:bodyPr lIns="91440" tIns="45720" rIns="91440" bIns="45720" rtlCol="0" anchor="ctr"/>
-          <a:lstStyle/>
-          <a:p>
-            <a:r>
-              <a:rPr lang="en-US" dirty="0">
-                <a:solidFill>
-                  <a:schemeClr val="accent4"/>
-                </a:solidFill>
-                <a:ea typeface="+mn-lt"/>
-                <a:cs typeface="+mn-lt"/>
-              </a:rPr>
-              <a:t>        </a:t>
-            </a:r>
-            <a:r>
-              <a:rPr lang="en-US" dirty="0" err="1">
-                <a:solidFill>
-                  <a:schemeClr val="accent4"/>
-                </a:solidFill>
-                <a:ea typeface="+mn-lt"/>
-                <a:cs typeface="+mn-lt"/>
-              </a:rPr>
-              <a:t>Переменные</a:t>
-            </a:r>
-            <a:r>
-              <a:rPr lang="en-US" dirty="0">
-                <a:solidFill>
-                  <a:schemeClr val="accent4"/>
-                </a:solidFill>
-                <a:ea typeface="+mn-lt"/>
-                <a:cs typeface="+mn-lt"/>
-              </a:rPr>
-              <a:t> </a:t>
-            </a:r>
-            <a:r>
-              <a:rPr lang="en-US" dirty="0" err="1">
-                <a:solidFill>
-                  <a:schemeClr val="accent4"/>
-                </a:solidFill>
-                <a:ea typeface="+mn-lt"/>
-                <a:cs typeface="+mn-lt"/>
-              </a:rPr>
-              <a:t>объекта</a:t>
-            </a:r>
-            <a:r>
-              <a:rPr lang="en-US" dirty="0">
-                <a:ea typeface="+mn-lt"/>
-                <a:cs typeface="+mn-lt"/>
-              </a:rPr>
-              <a:t> </a:t>
-            </a:r>
-            <a:r>
-              <a:rPr lang="en-US" dirty="0" err="1">
-                <a:ea typeface="+mn-lt"/>
-                <a:cs typeface="+mn-lt"/>
-              </a:rPr>
-              <a:t>принадлежат</a:t>
-            </a:r>
-            <a:r>
-              <a:rPr lang="en-US" dirty="0">
-                <a:ea typeface="+mn-lt"/>
-                <a:cs typeface="+mn-lt"/>
-              </a:rPr>
-              <a:t> </a:t>
-            </a:r>
-            <a:r>
-              <a:rPr lang="en-US" dirty="0" err="1">
-                <a:ea typeface="+mn-lt"/>
-                <a:cs typeface="+mn-lt"/>
-              </a:rPr>
-              <a:t>каждому</a:t>
-            </a:r>
-            <a:r>
-              <a:rPr lang="en-US" dirty="0">
-                <a:ea typeface="+mn-lt"/>
-                <a:cs typeface="+mn-lt"/>
-              </a:rPr>
-              <a:t> </a:t>
-            </a:r>
-            <a:r>
-              <a:rPr lang="en-US" dirty="0" err="1">
-                <a:ea typeface="+mn-lt"/>
-                <a:cs typeface="+mn-lt"/>
-              </a:rPr>
-              <a:t>отдельному</a:t>
-            </a:r>
-            <a:r>
-              <a:rPr lang="en-US" dirty="0">
-                <a:ea typeface="+mn-lt"/>
-                <a:cs typeface="+mn-lt"/>
-              </a:rPr>
-              <a:t> </a:t>
-            </a:r>
-            <a:r>
-              <a:rPr lang="en-US" dirty="0" err="1">
-                <a:ea typeface="+mn-lt"/>
-                <a:cs typeface="+mn-lt"/>
-              </a:rPr>
-              <a:t>экземпляру</a:t>
-            </a:r>
-            <a:r>
-              <a:rPr lang="en-US" dirty="0">
-                <a:ea typeface="+mn-lt"/>
-                <a:cs typeface="+mn-lt"/>
-              </a:rPr>
-              <a:t> </a:t>
-            </a:r>
-            <a:r>
-              <a:rPr lang="en-US" dirty="0" err="1">
-                <a:ea typeface="+mn-lt"/>
-                <a:cs typeface="+mn-lt"/>
-              </a:rPr>
-              <a:t>класса</a:t>
-            </a:r>
-            <a:r>
-              <a:rPr lang="en-US" dirty="0">
-                <a:ea typeface="+mn-lt"/>
-                <a:cs typeface="+mn-lt"/>
-              </a:rPr>
-              <a:t>. В </a:t>
-            </a:r>
-            <a:r>
-              <a:rPr lang="en-US" dirty="0" err="1">
-                <a:ea typeface="+mn-lt"/>
-                <a:cs typeface="+mn-lt"/>
-              </a:rPr>
-              <a:t>этом</a:t>
-            </a:r>
-            <a:r>
-              <a:rPr lang="en-US" dirty="0">
-                <a:ea typeface="+mn-lt"/>
-                <a:cs typeface="+mn-lt"/>
-              </a:rPr>
-              <a:t> </a:t>
-            </a:r>
-            <a:r>
-              <a:rPr lang="en-US" dirty="0" err="1">
-                <a:ea typeface="+mn-lt"/>
-                <a:cs typeface="+mn-lt"/>
-              </a:rPr>
-              <a:t>случае</a:t>
-            </a:r>
-            <a:r>
-              <a:rPr lang="en-US" dirty="0">
-                <a:ea typeface="+mn-lt"/>
-                <a:cs typeface="+mn-lt"/>
-              </a:rPr>
-              <a:t> у </a:t>
-            </a:r>
-            <a:r>
-              <a:rPr lang="en-US" dirty="0" err="1">
-                <a:ea typeface="+mn-lt"/>
-                <a:cs typeface="+mn-lt"/>
-              </a:rPr>
-              <a:t>каждого</a:t>
-            </a:r>
-            <a:r>
-              <a:rPr lang="en-US" dirty="0">
-                <a:ea typeface="+mn-lt"/>
-                <a:cs typeface="+mn-lt"/>
-              </a:rPr>
-              <a:t> </a:t>
-            </a:r>
-            <a:r>
-              <a:rPr lang="en-US" dirty="0" err="1">
-                <a:ea typeface="+mn-lt"/>
-                <a:cs typeface="+mn-lt"/>
-              </a:rPr>
-              <a:t>объекта</a:t>
-            </a:r>
-            <a:r>
-              <a:rPr lang="en-US" dirty="0">
-                <a:ea typeface="+mn-lt"/>
-                <a:cs typeface="+mn-lt"/>
-              </a:rPr>
-              <a:t> </a:t>
-            </a:r>
-            <a:r>
-              <a:rPr lang="en-US" dirty="0" err="1">
-                <a:ea typeface="+mn-lt"/>
-                <a:cs typeface="+mn-lt"/>
-              </a:rPr>
-              <a:t>есть</a:t>
-            </a:r>
-            <a:r>
-              <a:rPr lang="en-US" dirty="0">
-                <a:ea typeface="+mn-lt"/>
-                <a:cs typeface="+mn-lt"/>
-              </a:rPr>
-              <a:t> </a:t>
-            </a:r>
-            <a:r>
-              <a:rPr lang="en-US" dirty="0" err="1">
-                <a:ea typeface="+mn-lt"/>
-                <a:cs typeface="+mn-lt"/>
-              </a:rPr>
-              <a:t>своя</a:t>
-            </a:r>
-            <a:r>
-              <a:rPr lang="en-US" dirty="0">
-                <a:ea typeface="+mn-lt"/>
-                <a:cs typeface="+mn-lt"/>
-              </a:rPr>
-              <a:t> </a:t>
-            </a:r>
-            <a:r>
-              <a:rPr lang="en-US" dirty="0" err="1">
-                <a:ea typeface="+mn-lt"/>
-                <a:cs typeface="+mn-lt"/>
-              </a:rPr>
-              <a:t>собственная</a:t>
-            </a:r>
-            <a:r>
-              <a:rPr lang="en-US" dirty="0">
-                <a:ea typeface="+mn-lt"/>
-                <a:cs typeface="+mn-lt"/>
-              </a:rPr>
-              <a:t> </a:t>
-            </a:r>
-            <a:r>
-              <a:rPr lang="en-US" dirty="0" err="1">
-                <a:ea typeface="+mn-lt"/>
-                <a:cs typeface="+mn-lt"/>
-              </a:rPr>
-              <a:t>копия</a:t>
-            </a:r>
-            <a:r>
-              <a:rPr lang="en-US" dirty="0">
-                <a:ea typeface="+mn-lt"/>
-                <a:cs typeface="+mn-lt"/>
-              </a:rPr>
-              <a:t> </a:t>
-            </a:r>
-            <a:r>
-              <a:rPr lang="en-US" dirty="0" err="1">
-                <a:ea typeface="+mn-lt"/>
-                <a:cs typeface="+mn-lt"/>
-              </a:rPr>
-              <a:t>поля</a:t>
-            </a:r>
-            <a:r>
-              <a:rPr lang="en-US" dirty="0">
-                <a:ea typeface="+mn-lt"/>
-                <a:cs typeface="+mn-lt"/>
-              </a:rPr>
-              <a:t>, </a:t>
-            </a:r>
-            <a:r>
-              <a:rPr lang="en-US" dirty="0" err="1">
-                <a:ea typeface="+mn-lt"/>
-                <a:cs typeface="+mn-lt"/>
-              </a:rPr>
-              <a:t>т.е</a:t>
-            </a:r>
-            <a:r>
-              <a:rPr lang="en-US" dirty="0">
-                <a:ea typeface="+mn-lt"/>
-                <a:cs typeface="+mn-lt"/>
-              </a:rPr>
-              <a:t>. </a:t>
-            </a:r>
-            <a:r>
-              <a:rPr lang="en-US" dirty="0" err="1">
-                <a:ea typeface="+mn-lt"/>
-                <a:cs typeface="+mn-lt"/>
-              </a:rPr>
-              <a:t>не</a:t>
-            </a:r>
-            <a:r>
-              <a:rPr lang="en-US" dirty="0">
-                <a:ea typeface="+mn-lt"/>
-                <a:cs typeface="+mn-lt"/>
-              </a:rPr>
-              <a:t> </a:t>
-            </a:r>
-            <a:r>
-              <a:rPr lang="en-US" dirty="0" err="1">
-                <a:ea typeface="+mn-lt"/>
-                <a:cs typeface="+mn-lt"/>
-              </a:rPr>
-              <a:t>разделяемая</a:t>
-            </a:r>
-            <a:r>
-              <a:rPr lang="en-US" dirty="0">
-                <a:ea typeface="+mn-lt"/>
-                <a:cs typeface="+mn-lt"/>
-              </a:rPr>
-              <a:t> и </a:t>
-            </a:r>
-            <a:r>
-              <a:rPr lang="en-US" dirty="0" err="1">
-                <a:ea typeface="+mn-lt"/>
-                <a:cs typeface="+mn-lt"/>
-              </a:rPr>
-              <a:t>никоим</a:t>
-            </a:r>
-            <a:r>
-              <a:rPr lang="en-US" dirty="0">
-                <a:ea typeface="+mn-lt"/>
-                <a:cs typeface="+mn-lt"/>
-              </a:rPr>
-              <a:t> </a:t>
-            </a:r>
-            <a:r>
-              <a:rPr lang="en-US" dirty="0" err="1">
-                <a:ea typeface="+mn-lt"/>
-                <a:cs typeface="+mn-lt"/>
-              </a:rPr>
-              <a:t>образом</a:t>
-            </a:r>
-            <a:r>
-              <a:rPr lang="en-US" dirty="0">
-                <a:ea typeface="+mn-lt"/>
-                <a:cs typeface="+mn-lt"/>
-              </a:rPr>
-              <a:t> </a:t>
-            </a:r>
-            <a:r>
-              <a:rPr lang="en-US" dirty="0" err="1">
-                <a:ea typeface="+mn-lt"/>
-                <a:cs typeface="+mn-lt"/>
-              </a:rPr>
-              <a:t>не</a:t>
-            </a:r>
-            <a:r>
-              <a:rPr lang="en-US" dirty="0">
-                <a:ea typeface="+mn-lt"/>
-                <a:cs typeface="+mn-lt"/>
-              </a:rPr>
-              <a:t> </a:t>
-            </a:r>
-            <a:r>
-              <a:rPr lang="en-US" dirty="0" err="1">
-                <a:ea typeface="+mn-lt"/>
-                <a:cs typeface="+mn-lt"/>
-              </a:rPr>
-              <a:t>связанная</a:t>
-            </a:r>
-            <a:r>
-              <a:rPr lang="en-US" dirty="0">
-                <a:ea typeface="+mn-lt"/>
-                <a:cs typeface="+mn-lt"/>
-              </a:rPr>
-              <a:t> с </a:t>
-            </a:r>
-            <a:r>
-              <a:rPr lang="en-US" dirty="0" err="1">
-                <a:ea typeface="+mn-lt"/>
-                <a:cs typeface="+mn-lt"/>
-              </a:rPr>
-              <a:t>другими</a:t>
-            </a:r>
-            <a:r>
-              <a:rPr lang="en-US" dirty="0">
-                <a:ea typeface="+mn-lt"/>
-                <a:cs typeface="+mn-lt"/>
-              </a:rPr>
-              <a:t> </a:t>
-            </a:r>
-            <a:r>
-              <a:rPr lang="en-US" dirty="0" err="1">
-                <a:ea typeface="+mn-lt"/>
-                <a:cs typeface="+mn-lt"/>
-              </a:rPr>
-              <a:t>такими</a:t>
-            </a:r>
-            <a:r>
-              <a:rPr lang="en-US" dirty="0">
-                <a:ea typeface="+mn-lt"/>
-                <a:cs typeface="+mn-lt"/>
-              </a:rPr>
-              <a:t> </a:t>
-            </a:r>
-            <a:r>
-              <a:rPr lang="en-US" dirty="0" err="1">
-                <a:ea typeface="+mn-lt"/>
-                <a:cs typeface="+mn-lt"/>
-              </a:rPr>
-              <a:t>же</a:t>
-            </a:r>
-            <a:r>
-              <a:rPr lang="en-US" dirty="0">
-                <a:ea typeface="+mn-lt"/>
-                <a:cs typeface="+mn-lt"/>
-              </a:rPr>
-              <a:t> </a:t>
-            </a:r>
-            <a:r>
-              <a:rPr lang="en-US" dirty="0" err="1">
-                <a:ea typeface="+mn-lt"/>
-                <a:cs typeface="+mn-lt"/>
-              </a:rPr>
-              <a:t>полями</a:t>
-            </a:r>
-            <a:r>
-              <a:rPr lang="en-US" dirty="0">
-                <a:ea typeface="+mn-lt"/>
-                <a:cs typeface="+mn-lt"/>
-              </a:rPr>
-              <a:t> в </a:t>
-            </a:r>
-            <a:r>
-              <a:rPr lang="en-US" dirty="0" err="1">
-                <a:ea typeface="+mn-lt"/>
-                <a:cs typeface="+mn-lt"/>
-              </a:rPr>
-              <a:t>других</a:t>
-            </a:r>
-            <a:r>
-              <a:rPr lang="en-US" dirty="0">
-                <a:ea typeface="+mn-lt"/>
-                <a:cs typeface="+mn-lt"/>
-              </a:rPr>
-              <a:t> </a:t>
-            </a:r>
-            <a:r>
-              <a:rPr lang="en-US" dirty="0" err="1">
-                <a:ea typeface="+mn-lt"/>
-                <a:cs typeface="+mn-lt"/>
-              </a:rPr>
-              <a:t>экземплярах</a:t>
-            </a:r>
-            <a:r>
-              <a:rPr lang="en-US" dirty="0">
-                <a:ea typeface="+mn-lt"/>
-                <a:cs typeface="+mn-lt"/>
-              </a:rPr>
-              <a:t>.</a:t>
-            </a:r>
-            <a:endParaRPr lang="en-US" dirty="0" err="1">
-              <a:ea typeface="+mn-lt"/>
-              <a:cs typeface="+mn-lt"/>
-            </a:endParaRPr>
-          </a:p>
-        </p:txBody>
-      </p:sp>
-    </p:spTree>
-    <p:extLst>
-      <p:ext uri="{BB962C8B-B14F-4D97-AF65-F5344CB8AC3E}">
-        <p14:creationId xmlns:p14="http://schemas.microsoft.com/office/powerpoint/2010/main" val="2843408974"/>
-      </p:ext>
-    </p:extLst>
-  </p:cSld>
-  <p:clrMapOvr>
-    <a:masterClrMapping/>
-  </p:clrMapOvr>
-</p:sld>
-</file>
-
-<file path=ppt/slides/slide12.xml><?xml version="1.0" encoding="utf-8"?>
-<p:sld xmlns:a="http://schemas.openxmlformats.org/drawingml/2006/main" xmlns:r="http://schemas.openxmlformats.org/officeDocument/2006/relationships" xmlns:p="http://schemas.openxmlformats.org/presentationml/2006/main">
-  <p:cSld>
-    <p:spTree>
-      <p:nvGrpSpPr>
-        <p:cNvPr id="1" name=""/>
-        <p:cNvGrpSpPr/>
-        <p:nvPr/>
-      </p:nvGrpSpPr>
-      <p:grpSpPr>
-        <a:xfrm>
-          <a:off x="0" y="0"/>
-          <a:ext cx="0" cy="0"/>
-          <a:chOff x="0" y="0"/>
-          <a:chExt cx="0" cy="0"/>
-        </a:xfrm>
-      </p:grpSpPr>
-      <p:sp>
-        <p:nvSpPr>
-          <p:cNvPr id="3" name="Прямоугольник 4">
-            <a:extLst>
-              <a:ext uri="{FF2B5EF4-FFF2-40B4-BE49-F238E27FC236}">
-                <a16:creationId xmlns:a16="http://schemas.microsoft.com/office/drawing/2014/main" id="{E18833D8-4A15-461E-A767-C95346D8F319}"/>
-              </a:ext>
-            </a:extLst>
-          </p:cNvPr>
-          <p:cNvSpPr/>
-          <p:nvPr/>
-        </p:nvSpPr>
-        <p:spPr>
-          <a:xfrm>
-            <a:off x="569167" y="242596"/>
-            <a:ext cx="11150082" cy="811763"/>
-          </a:xfrm>
-          <a:prstGeom prst="rect">
-            <a:avLst/>
-          </a:prstGeom>
-        </p:spPr>
-        <p:style>
-          <a:lnRef idx="2">
-            <a:schemeClr val="accent1">
-              <a:shade val="50000"/>
-            </a:schemeClr>
-          </a:lnRef>
-          <a:fillRef idx="1">
-            <a:schemeClr val="accent1"/>
-          </a:fillRef>
-          <a:effectRef idx="0">
-            <a:schemeClr val="accent1"/>
-          </a:effectRef>
-          <a:fontRef idx="minor">
-            <a:schemeClr val="lt1"/>
-          </a:fontRef>
-        </p:style>
-        <p:txBody>
-          <a:bodyPr lIns="91440" tIns="45720" rIns="91440" bIns="45720" rtlCol="0" anchor="ctr"/>
-          <a:lstStyle/>
-          <a:p>
-            <a:pPr algn="ctr"/>
-            <a:r>
-              <a:rPr lang="ru-RU" sz="3200" b="1" dirty="0">
-                <a:ln w="12700" cmpd="sng">
-                  <a:solidFill>
-                    <a:srgbClr val="FFC000"/>
-                  </a:solidFill>
-                  <a:prstDash val="solid"/>
-                </a:ln>
-                <a:solidFill>
-                  <a:srgbClr val="FFC000"/>
-                </a:solidFill>
-                <a:cs typeface="Calibri"/>
-              </a:rPr>
-              <a:t>Метод __</a:t>
-            </a:r>
-            <a:r>
-              <a:rPr lang="ru-RU" sz="3200" b="1" dirty="0" err="1">
-                <a:ln w="12700" cmpd="sng">
-                  <a:solidFill>
-                    <a:srgbClr val="FFC000"/>
-                  </a:solidFill>
-                  <a:prstDash val="solid"/>
-                </a:ln>
-                <a:solidFill>
-                  <a:srgbClr val="FFC000"/>
-                </a:solidFill>
-                <a:cs typeface="Calibri"/>
-              </a:rPr>
-              <a:t>init</a:t>
-            </a:r>
-            <a:r>
-              <a:rPr lang="ru-RU" sz="3200" b="1" dirty="0">
-                <a:ln w="12700" cmpd="sng">
-                  <a:solidFill>
-                    <a:srgbClr val="FFC000"/>
-                  </a:solidFill>
-                  <a:prstDash val="solid"/>
-                </a:ln>
-                <a:solidFill>
-                  <a:srgbClr val="FFC000"/>
-                </a:solidFill>
-                <a:cs typeface="Calibri"/>
-              </a:rPr>
-              <a:t>__()</a:t>
-            </a:r>
-            <a:endParaRPr lang="en-US" dirty="0"/>
-          </a:p>
-        </p:txBody>
-      </p:sp>
-      <p:sp>
-        <p:nvSpPr>
-          <p:cNvPr id="7" name="TextBox 6">
-            <a:extLst>
-              <a:ext uri="{FF2B5EF4-FFF2-40B4-BE49-F238E27FC236}">
-                <a16:creationId xmlns:a16="http://schemas.microsoft.com/office/drawing/2014/main" id="{9E563B2B-A867-4395-AEDC-12236EADC6E9}"/>
-              </a:ext>
-            </a:extLst>
-          </p:cNvPr>
-          <p:cNvSpPr txBox="1"/>
-          <p:nvPr/>
-        </p:nvSpPr>
-        <p:spPr>
-          <a:xfrm>
-            <a:off x="7223220" y="1466547"/>
-            <a:ext cx="3300045" cy="369332"/>
-          </a:xfrm>
-          <a:prstGeom prst="rect">
-            <a:avLst/>
-          </a:prstGeom>
-          <a:noFill/>
-        </p:spPr>
-        <p:txBody>
-          <a:bodyPr rot="0" spcFirstLastPara="0" vertOverflow="overflow" horzOverflow="overflow" vert="horz" wrap="square" lIns="91440" tIns="45720" rIns="91440" bIns="45720" numCol="1" spcCol="0" rtlCol="0" fromWordArt="0" anchor="t" anchorCtr="0" forceAA="0" compatLnSpc="1">
-            <a:prstTxWarp prst="textNoShape">
-              <a:avLst/>
-            </a:prstTxWarp>
-            <a:spAutoFit/>
-          </a:bodyPr>
-          <a:lstStyle/>
-          <a:p>
-            <a:r>
-              <a:rPr lang="en-US" b="1" dirty="0" err="1"/>
-              <a:t>Вывод</a:t>
-            </a:r>
-            <a:r>
-              <a:rPr lang="en-US" b="1" dirty="0"/>
-              <a:t>:</a:t>
-            </a:r>
-            <a:endParaRPr lang="en-US" dirty="0"/>
-          </a:p>
-        </p:txBody>
-      </p:sp>
-      <p:sp>
-        <p:nvSpPr>
-          <p:cNvPr id="8" name="TextBox 7">
-            <a:extLst>
-              <a:ext uri="{FF2B5EF4-FFF2-40B4-BE49-F238E27FC236}">
-                <a16:creationId xmlns:a16="http://schemas.microsoft.com/office/drawing/2014/main" id="{B7D35D61-5E53-475C-A6B5-ED712242C129}"/>
-              </a:ext>
-            </a:extLst>
-          </p:cNvPr>
-          <p:cNvSpPr txBox="1"/>
-          <p:nvPr/>
-        </p:nvSpPr>
-        <p:spPr>
-          <a:xfrm>
-            <a:off x="625650" y="1485837"/>
-            <a:ext cx="4283893" cy="369332"/>
-          </a:xfrm>
-          <a:prstGeom prst="rect">
-            <a:avLst/>
-          </a:prstGeom>
-          <a:noFill/>
-        </p:spPr>
-        <p:txBody>
-          <a:bodyPr rot="0" spcFirstLastPara="0" vertOverflow="overflow" horzOverflow="overflow" vert="horz" wrap="square" lIns="91440" tIns="45720" rIns="91440" bIns="45720" numCol="1" spcCol="0" rtlCol="0" fromWordArt="0" anchor="t" anchorCtr="0" forceAA="0" compatLnSpc="1">
-            <a:prstTxWarp prst="textNoShape">
-              <a:avLst/>
-            </a:prstTxWarp>
-            <a:spAutoFit/>
-          </a:bodyPr>
-          <a:lstStyle/>
-          <a:p>
-            <a:r>
-              <a:rPr lang="en-US" b="1" dirty="0" err="1"/>
-              <a:t>Добавим</a:t>
-            </a:r>
-            <a:r>
-              <a:rPr lang="en-US" b="1" dirty="0"/>
-              <a:t> </a:t>
-            </a:r>
-            <a:r>
-              <a:rPr lang="en-US" b="1" dirty="0" err="1"/>
-              <a:t>метод</a:t>
-            </a:r>
-            <a:r>
-              <a:rPr lang="en-US" b="1" dirty="0"/>
-              <a:t>  __</a:t>
-            </a:r>
-            <a:r>
-              <a:rPr lang="en-US" b="1" dirty="0" err="1"/>
-              <a:t>init</a:t>
-            </a:r>
-            <a:r>
-              <a:rPr lang="en-US" b="1" dirty="0"/>
-              <a:t>__():</a:t>
-            </a:r>
-            <a:endParaRPr lang="en-US" dirty="0"/>
-          </a:p>
-        </p:txBody>
-      </p:sp>
-      <p:sp>
-        <p:nvSpPr>
-          <p:cNvPr id="10" name="Rectangle: Rounded Corners 9">
-            <a:extLst>
-              <a:ext uri="{FF2B5EF4-FFF2-40B4-BE49-F238E27FC236}">
-                <a16:creationId xmlns:a16="http://schemas.microsoft.com/office/drawing/2014/main" id="{D3F0D205-16F8-44E0-A5A4-74B17F1E76A5}"/>
-              </a:ext>
-            </a:extLst>
-          </p:cNvPr>
-          <p:cNvSpPr/>
-          <p:nvPr/>
-        </p:nvSpPr>
-        <p:spPr>
-          <a:xfrm>
-            <a:off x="1082549" y="5135791"/>
-            <a:ext cx="10399528" cy="1229684"/>
-          </a:xfrm>
-          <a:prstGeom prst="roundRect">
-            <a:avLst/>
-          </a:prstGeom>
-        </p:spPr>
-        <p:style>
-          <a:lnRef idx="2">
-            <a:schemeClr val="accent1">
-              <a:shade val="50000"/>
-            </a:schemeClr>
-          </a:lnRef>
-          <a:fillRef idx="1">
-            <a:schemeClr val="accent1"/>
-          </a:fillRef>
-          <a:effectRef idx="0">
-            <a:schemeClr val="accent1"/>
-          </a:effectRef>
-          <a:fontRef idx="minor">
-            <a:schemeClr val="lt1"/>
-          </a:fontRef>
-        </p:style>
-        <p:txBody>
-          <a:bodyPr lIns="91440" tIns="45720" rIns="91440" bIns="45720" rtlCol="0" anchor="ctr"/>
-          <a:lstStyle/>
-          <a:p>
-            <a:r>
-              <a:rPr lang="en-US" b="1" dirty="0">
-                <a:solidFill>
-                  <a:srgbClr val="FFC000"/>
-                </a:solidFill>
-                <a:ea typeface="+mn-lt"/>
-                <a:cs typeface="+mn-lt"/>
-              </a:rPr>
-              <a:t>    </a:t>
-            </a:r>
-            <a:r>
-              <a:rPr lang="en-US" dirty="0" err="1">
-                <a:solidFill>
-                  <a:schemeClr val="accent4"/>
-                </a:solidFill>
-                <a:ea typeface="+mn-lt"/>
-                <a:cs typeface="+mn-lt"/>
-              </a:rPr>
-              <a:t>Метод</a:t>
-            </a:r>
-            <a:r>
-              <a:rPr lang="en-US" dirty="0">
-                <a:solidFill>
-                  <a:schemeClr val="accent4"/>
-                </a:solidFill>
-                <a:ea typeface="+mn-lt"/>
-                <a:cs typeface="+mn-lt"/>
-              </a:rPr>
-              <a:t> __</a:t>
-            </a:r>
-            <a:r>
-              <a:rPr lang="en-US" dirty="0" err="1">
-                <a:solidFill>
-                  <a:schemeClr val="accent4"/>
-                </a:solidFill>
-                <a:ea typeface="+mn-lt"/>
-                <a:cs typeface="+mn-lt"/>
-              </a:rPr>
-              <a:t>init</a:t>
-            </a:r>
-            <a:r>
-              <a:rPr lang="en-US" dirty="0">
-                <a:solidFill>
-                  <a:schemeClr val="accent4"/>
-                </a:solidFill>
-                <a:ea typeface="+mn-lt"/>
-                <a:cs typeface="+mn-lt"/>
-              </a:rPr>
-              <a:t>__ </a:t>
-            </a:r>
-            <a:r>
-              <a:rPr lang="en-US" dirty="0" err="1">
-                <a:ea typeface="+mn-lt"/>
-                <a:cs typeface="+mn-lt"/>
-              </a:rPr>
-              <a:t>запускается</a:t>
-            </a:r>
-            <a:r>
-              <a:rPr lang="en-US" dirty="0">
-                <a:ea typeface="+mn-lt"/>
-                <a:cs typeface="+mn-lt"/>
-              </a:rPr>
-              <a:t>, </a:t>
-            </a:r>
-            <a:r>
-              <a:rPr lang="en-US" dirty="0" err="1">
-                <a:ea typeface="+mn-lt"/>
-                <a:cs typeface="+mn-lt"/>
-              </a:rPr>
-              <a:t>как</a:t>
-            </a:r>
-            <a:r>
-              <a:rPr lang="en-US" dirty="0">
-                <a:ea typeface="+mn-lt"/>
-                <a:cs typeface="+mn-lt"/>
-              </a:rPr>
-              <a:t> </a:t>
-            </a:r>
-            <a:r>
-              <a:rPr lang="en-US" dirty="0" err="1">
-                <a:ea typeface="+mn-lt"/>
-                <a:cs typeface="+mn-lt"/>
-              </a:rPr>
-              <a:t>только</a:t>
-            </a:r>
-            <a:r>
-              <a:rPr lang="en-US" dirty="0">
-                <a:ea typeface="+mn-lt"/>
-                <a:cs typeface="+mn-lt"/>
-              </a:rPr>
-              <a:t> </a:t>
-            </a:r>
-            <a:r>
-              <a:rPr lang="en-US" dirty="0" err="1">
-                <a:ea typeface="+mn-lt"/>
-                <a:cs typeface="+mn-lt"/>
-              </a:rPr>
-              <a:t>объект</a:t>
-            </a:r>
-            <a:r>
-              <a:rPr lang="en-US" dirty="0">
-                <a:ea typeface="+mn-lt"/>
-                <a:cs typeface="+mn-lt"/>
-              </a:rPr>
-              <a:t> </a:t>
-            </a:r>
-            <a:r>
-              <a:rPr lang="en-US" dirty="0" err="1">
-                <a:ea typeface="+mn-lt"/>
-                <a:cs typeface="+mn-lt"/>
-              </a:rPr>
-              <a:t>класса</a:t>
-            </a:r>
-            <a:r>
-              <a:rPr lang="en-US" dirty="0">
-                <a:ea typeface="+mn-lt"/>
-                <a:cs typeface="+mn-lt"/>
-              </a:rPr>
-              <a:t> </a:t>
-            </a:r>
-            <a:r>
-              <a:rPr lang="en-US" dirty="0" err="1">
-                <a:ea typeface="+mn-lt"/>
-                <a:cs typeface="+mn-lt"/>
-              </a:rPr>
-              <a:t>реализуется</a:t>
-            </a:r>
-            <a:r>
-              <a:rPr lang="en-US" dirty="0">
-                <a:ea typeface="+mn-lt"/>
-                <a:cs typeface="+mn-lt"/>
-              </a:rPr>
-              <a:t>. </a:t>
-            </a:r>
-            <a:r>
-              <a:rPr lang="en-US" dirty="0" err="1">
-                <a:ea typeface="+mn-lt"/>
-                <a:cs typeface="+mn-lt"/>
-              </a:rPr>
-              <a:t>Этот</a:t>
-            </a:r>
-            <a:r>
-              <a:rPr lang="en-US" dirty="0">
-                <a:ea typeface="+mn-lt"/>
-                <a:cs typeface="+mn-lt"/>
-              </a:rPr>
-              <a:t> </a:t>
-            </a:r>
-            <a:r>
-              <a:rPr lang="en-US" dirty="0" err="1">
-                <a:ea typeface="+mn-lt"/>
-                <a:cs typeface="+mn-lt"/>
-              </a:rPr>
-              <a:t>метод</a:t>
-            </a:r>
-            <a:r>
-              <a:rPr lang="en-US" dirty="0">
-                <a:ea typeface="+mn-lt"/>
-                <a:cs typeface="+mn-lt"/>
-              </a:rPr>
-              <a:t> </a:t>
-            </a:r>
-            <a:r>
-              <a:rPr lang="en-US" dirty="0" err="1">
-                <a:ea typeface="+mn-lt"/>
-                <a:cs typeface="+mn-lt"/>
-              </a:rPr>
-              <a:t>полезен</a:t>
-            </a:r>
-            <a:endParaRPr lang="en-US" dirty="0" err="1">
-              <a:solidFill>
-                <a:srgbClr val="FFFFFF"/>
-              </a:solidFill>
-              <a:ea typeface="+mn-lt"/>
-              <a:cs typeface="+mn-lt"/>
-            </a:endParaRPr>
-          </a:p>
-          <a:p>
-            <a:r>
-              <a:rPr lang="en-US" dirty="0" err="1">
-                <a:ea typeface="+mn-lt"/>
-                <a:cs typeface="+mn-lt"/>
-              </a:rPr>
-              <a:t>для</a:t>
-            </a:r>
-            <a:r>
-              <a:rPr lang="en-US" dirty="0">
-                <a:ea typeface="+mn-lt"/>
-                <a:cs typeface="+mn-lt"/>
-              </a:rPr>
-              <a:t> </a:t>
-            </a:r>
-            <a:r>
-              <a:rPr lang="en-US" dirty="0" err="1">
-                <a:ea typeface="+mn-lt"/>
-                <a:cs typeface="+mn-lt"/>
-              </a:rPr>
-              <a:t>осуществления</a:t>
-            </a:r>
-            <a:r>
-              <a:rPr lang="en-US" dirty="0">
-                <a:ea typeface="+mn-lt"/>
-                <a:cs typeface="+mn-lt"/>
-              </a:rPr>
-              <a:t> </a:t>
-            </a:r>
-            <a:r>
-              <a:rPr lang="en-US" dirty="0" err="1">
-                <a:ea typeface="+mn-lt"/>
-                <a:cs typeface="+mn-lt"/>
-              </a:rPr>
-              <a:t>разного</a:t>
-            </a:r>
-            <a:r>
-              <a:rPr lang="en-US" dirty="0">
-                <a:ea typeface="+mn-lt"/>
-                <a:cs typeface="+mn-lt"/>
-              </a:rPr>
-              <a:t> </a:t>
-            </a:r>
-            <a:r>
-              <a:rPr lang="en-US" dirty="0" err="1">
-                <a:ea typeface="+mn-lt"/>
-                <a:cs typeface="+mn-lt"/>
-              </a:rPr>
-              <a:t>рода</a:t>
-            </a:r>
-            <a:r>
-              <a:rPr lang="en-US" dirty="0">
-                <a:ea typeface="+mn-lt"/>
-                <a:cs typeface="+mn-lt"/>
-              </a:rPr>
-              <a:t> </a:t>
-            </a:r>
-            <a:r>
-              <a:rPr lang="en-US" dirty="0" err="1">
-                <a:ea typeface="+mn-lt"/>
-                <a:cs typeface="+mn-lt"/>
-              </a:rPr>
-              <a:t>инициализации</a:t>
-            </a:r>
-            <a:r>
-              <a:rPr lang="en-US" dirty="0">
-                <a:ea typeface="+mn-lt"/>
-                <a:cs typeface="+mn-lt"/>
-              </a:rPr>
-              <a:t>, </a:t>
-            </a:r>
-            <a:r>
-              <a:rPr lang="en-US" dirty="0" err="1">
-                <a:ea typeface="+mn-lt"/>
-                <a:cs typeface="+mn-lt"/>
-              </a:rPr>
-              <a:t>необходимой</a:t>
-            </a:r>
-            <a:r>
-              <a:rPr lang="en-US" dirty="0">
-                <a:ea typeface="+mn-lt"/>
-                <a:cs typeface="+mn-lt"/>
-              </a:rPr>
-              <a:t> </a:t>
-            </a:r>
-            <a:r>
-              <a:rPr lang="en-US" dirty="0" err="1">
-                <a:ea typeface="+mn-lt"/>
-                <a:cs typeface="+mn-lt"/>
-              </a:rPr>
-              <a:t>для</a:t>
-            </a:r>
-            <a:r>
-              <a:rPr lang="en-US" dirty="0">
-                <a:ea typeface="+mn-lt"/>
-                <a:cs typeface="+mn-lt"/>
-              </a:rPr>
-              <a:t> </a:t>
-            </a:r>
-            <a:r>
-              <a:rPr lang="en-US" dirty="0" err="1">
-                <a:ea typeface="+mn-lt"/>
-                <a:cs typeface="+mn-lt"/>
-              </a:rPr>
-              <a:t>данного</a:t>
-            </a:r>
-            <a:r>
-              <a:rPr lang="en-US" dirty="0">
-                <a:ea typeface="+mn-lt"/>
-                <a:cs typeface="+mn-lt"/>
-              </a:rPr>
-              <a:t> </a:t>
-            </a:r>
-            <a:r>
-              <a:rPr lang="en-US" dirty="0" err="1">
-                <a:ea typeface="+mn-lt"/>
-                <a:cs typeface="+mn-lt"/>
-              </a:rPr>
-              <a:t>объекта</a:t>
-            </a:r>
-            <a:r>
-              <a:rPr lang="en-US" dirty="0">
-                <a:ea typeface="+mn-lt"/>
-                <a:cs typeface="+mn-lt"/>
-              </a:rPr>
-              <a:t>. </a:t>
-            </a:r>
-            <a:r>
-              <a:rPr lang="en-US" dirty="0" err="1">
-                <a:ea typeface="+mn-lt"/>
-                <a:cs typeface="+mn-lt"/>
-              </a:rPr>
-              <a:t>Об</a:t>
-            </a:r>
-            <a:r>
-              <a:rPr lang="en-US" dirty="0">
-                <a:ea typeface="+mn-lt"/>
-                <a:cs typeface="+mn-lt"/>
-              </a:rPr>
-              <a:t>-</a:t>
-            </a:r>
-            <a:endParaRPr lang="en-US" dirty="0"/>
-          </a:p>
-          <a:p>
-            <a:r>
-              <a:rPr lang="en-US" dirty="0" err="1">
-                <a:ea typeface="+mn-lt"/>
-                <a:cs typeface="+mn-lt"/>
-              </a:rPr>
-              <a:t>ратите</a:t>
-            </a:r>
-            <a:r>
-              <a:rPr lang="en-US" dirty="0">
-                <a:ea typeface="+mn-lt"/>
-                <a:cs typeface="+mn-lt"/>
-              </a:rPr>
-              <a:t> </a:t>
-            </a:r>
-            <a:r>
-              <a:rPr lang="en-US" dirty="0" err="1">
-                <a:ea typeface="+mn-lt"/>
-                <a:cs typeface="+mn-lt"/>
-              </a:rPr>
-              <a:t>внимание</a:t>
-            </a:r>
-            <a:r>
-              <a:rPr lang="en-US" dirty="0">
-                <a:ea typeface="+mn-lt"/>
-                <a:cs typeface="+mn-lt"/>
-              </a:rPr>
-              <a:t> </a:t>
-            </a:r>
-            <a:r>
-              <a:rPr lang="en-US" dirty="0" err="1">
-                <a:ea typeface="+mn-lt"/>
-                <a:cs typeface="+mn-lt"/>
-              </a:rPr>
-              <a:t>на</a:t>
-            </a:r>
-            <a:r>
-              <a:rPr lang="en-US" dirty="0">
-                <a:ea typeface="+mn-lt"/>
-                <a:cs typeface="+mn-lt"/>
-              </a:rPr>
-              <a:t> </a:t>
-            </a:r>
-            <a:r>
-              <a:rPr lang="en-US" dirty="0" err="1">
-                <a:ea typeface="+mn-lt"/>
-                <a:cs typeface="+mn-lt"/>
-              </a:rPr>
-              <a:t>двойные</a:t>
-            </a:r>
-            <a:r>
-              <a:rPr lang="en-US" dirty="0">
-                <a:ea typeface="+mn-lt"/>
-                <a:cs typeface="+mn-lt"/>
-              </a:rPr>
-              <a:t> </a:t>
-            </a:r>
-            <a:r>
-              <a:rPr lang="en-US" dirty="0" err="1">
-                <a:ea typeface="+mn-lt"/>
-                <a:cs typeface="+mn-lt"/>
-              </a:rPr>
-              <a:t>подчёркивания</a:t>
-            </a:r>
-            <a:r>
-              <a:rPr lang="en-US" dirty="0">
-                <a:ea typeface="+mn-lt"/>
-                <a:cs typeface="+mn-lt"/>
-              </a:rPr>
-              <a:t> в </a:t>
-            </a:r>
-            <a:r>
-              <a:rPr lang="en-US" dirty="0" err="1">
-                <a:ea typeface="+mn-lt"/>
-                <a:cs typeface="+mn-lt"/>
-              </a:rPr>
-              <a:t>начале</a:t>
-            </a:r>
-            <a:r>
-              <a:rPr lang="en-US" dirty="0">
-                <a:ea typeface="+mn-lt"/>
-                <a:cs typeface="+mn-lt"/>
-              </a:rPr>
-              <a:t> и в </a:t>
-            </a:r>
-            <a:r>
-              <a:rPr lang="en-US" dirty="0" err="1">
-                <a:ea typeface="+mn-lt"/>
-                <a:cs typeface="+mn-lt"/>
-              </a:rPr>
-              <a:t>конце</a:t>
-            </a:r>
-            <a:r>
-              <a:rPr lang="en-US" dirty="0">
-                <a:ea typeface="+mn-lt"/>
-                <a:cs typeface="+mn-lt"/>
-              </a:rPr>
-              <a:t> </a:t>
-            </a:r>
-            <a:r>
-              <a:rPr lang="en-US" dirty="0" err="1">
-                <a:ea typeface="+mn-lt"/>
-                <a:cs typeface="+mn-lt"/>
-              </a:rPr>
-              <a:t>имени</a:t>
-            </a:r>
-            <a:r>
-              <a:rPr lang="en-US" dirty="0">
-                <a:ea typeface="+mn-lt"/>
-                <a:cs typeface="+mn-lt"/>
-              </a:rPr>
-              <a:t>.</a:t>
-            </a:r>
-          </a:p>
-        </p:txBody>
-      </p:sp>
-      <p:pic>
-        <p:nvPicPr>
-          <p:cNvPr id="13" name="Picture 13">
-            <a:extLst>
-              <a:ext uri="{FF2B5EF4-FFF2-40B4-BE49-F238E27FC236}">
-                <a16:creationId xmlns:a16="http://schemas.microsoft.com/office/drawing/2014/main" id="{9283159F-5087-4FCF-9CC8-1238BB6EA2CB}"/>
-              </a:ext>
-            </a:extLst>
-          </p:cNvPr>
-          <p:cNvPicPr>
-            <a:picLocks noChangeAspect="1"/>
-          </p:cNvPicPr>
-          <p:nvPr/>
-        </p:nvPicPr>
-        <p:blipFill>
-          <a:blip r:embed="rId2"/>
-          <a:stretch>
-            <a:fillRect/>
-          </a:stretch>
-        </p:blipFill>
-        <p:spPr>
-          <a:xfrm>
-            <a:off x="1531716" y="2057880"/>
-            <a:ext cx="4016414" cy="2607202"/>
-          </a:xfrm>
-          <a:prstGeom prst="rect">
-            <a:avLst/>
-          </a:prstGeom>
-        </p:spPr>
-      </p:pic>
-      <p:pic>
-        <p:nvPicPr>
-          <p:cNvPr id="14" name="Picture 14">
-            <a:extLst>
-              <a:ext uri="{FF2B5EF4-FFF2-40B4-BE49-F238E27FC236}">
-                <a16:creationId xmlns:a16="http://schemas.microsoft.com/office/drawing/2014/main" id="{1E9B8C3C-8A56-4C1F-91B0-938222B32DEC}"/>
-              </a:ext>
-            </a:extLst>
-          </p:cNvPr>
-          <p:cNvPicPr>
-            <a:picLocks noChangeAspect="1"/>
-          </p:cNvPicPr>
-          <p:nvPr/>
-        </p:nvPicPr>
-        <p:blipFill>
-          <a:blip r:embed="rId3"/>
-          <a:stretch>
-            <a:fillRect/>
-          </a:stretch>
-        </p:blipFill>
-        <p:spPr>
-          <a:xfrm>
-            <a:off x="7415514" y="2101986"/>
-            <a:ext cx="4508339" cy="937117"/>
-          </a:xfrm>
-          <a:prstGeom prst="rect">
-            <a:avLst/>
-          </a:prstGeom>
-        </p:spPr>
-      </p:pic>
-    </p:spTree>
-    <p:extLst>
-      <p:ext uri="{BB962C8B-B14F-4D97-AF65-F5344CB8AC3E}">
-        <p14:creationId xmlns:p14="http://schemas.microsoft.com/office/powerpoint/2010/main" val="1867017099"/>
-      </p:ext>
-    </p:extLst>
-  </p:cSld>
-  <p:clrMapOvr>
-    <a:masterClrMapping/>
-  </p:clrMapOvr>
-</p:sld>
-</file>
-
-<file path=ppt/slides/slide13.xml><?xml version="1.0" encoding="utf-8"?>
-<p:sld xmlns:a="http://schemas.openxmlformats.org/drawingml/2006/main" xmlns:r="http://schemas.openxmlformats.org/officeDocument/2006/relationships" xmlns:p="http://schemas.openxmlformats.org/presentationml/2006/main">
-  <p:cSld>
-    <p:spTree>
-      <p:nvGrpSpPr>
-        <p:cNvPr id="1" name=""/>
-        <p:cNvGrpSpPr/>
-        <p:nvPr/>
-      </p:nvGrpSpPr>
-      <p:grpSpPr>
-        <a:xfrm>
-          <a:off x="0" y="0"/>
-          <a:ext cx="0" cy="0"/>
-          <a:chOff x="0" y="0"/>
-          <a:chExt cx="0" cy="0"/>
-        </a:xfrm>
-      </p:grpSpPr>
-      <p:sp>
-        <p:nvSpPr>
-          <p:cNvPr id="19" name="Прямоугольник 4">
-            <a:extLst>
-              <a:ext uri="{FF2B5EF4-FFF2-40B4-BE49-F238E27FC236}">
-                <a16:creationId xmlns:a16="http://schemas.microsoft.com/office/drawing/2014/main" id="{7A796137-1066-4DB9-8DC6-5377E016B8A2}"/>
-              </a:ext>
-            </a:extLst>
-          </p:cNvPr>
-          <p:cNvSpPr/>
-          <p:nvPr/>
-        </p:nvSpPr>
-        <p:spPr>
-          <a:xfrm>
-            <a:off x="569167" y="242596"/>
-            <a:ext cx="11150082" cy="811763"/>
-          </a:xfrm>
-          <a:prstGeom prst="rect">
-            <a:avLst/>
-          </a:prstGeom>
-        </p:spPr>
-        <p:style>
-          <a:lnRef idx="2">
-            <a:schemeClr val="accent1">
-              <a:shade val="50000"/>
-            </a:schemeClr>
-          </a:lnRef>
-          <a:fillRef idx="1">
-            <a:schemeClr val="accent1"/>
-          </a:fillRef>
-          <a:effectRef idx="0">
-            <a:schemeClr val="accent1"/>
-          </a:effectRef>
-          <a:fontRef idx="minor">
-            <a:schemeClr val="lt1"/>
-          </a:fontRef>
-        </p:style>
-        <p:txBody>
-          <a:bodyPr lIns="91440" tIns="45720" rIns="91440" bIns="45720" rtlCol="0" anchor="ctr"/>
-          <a:lstStyle/>
-          <a:p>
-            <a:pPr algn="ctr"/>
-            <a:r>
-              <a:rPr lang="ru-RU" sz="3200" b="1" dirty="0">
-                <a:ln w="12700" cmpd="sng">
-                  <a:solidFill>
-                    <a:srgbClr val="FFC000"/>
-                  </a:solidFill>
-                  <a:prstDash val="solid"/>
-                </a:ln>
-                <a:solidFill>
-                  <a:srgbClr val="FFC000"/>
-                </a:solidFill>
-                <a:cs typeface="Calibri"/>
-              </a:rPr>
-              <a:t>Объектно-ориентированное программирование</a:t>
-            </a:r>
-          </a:p>
-        </p:txBody>
-      </p:sp>
-      <p:pic>
-        <p:nvPicPr>
-          <p:cNvPr id="2" name="Picture 4">
-            <a:extLst>
-              <a:ext uri="{FF2B5EF4-FFF2-40B4-BE49-F238E27FC236}">
-                <a16:creationId xmlns:a16="http://schemas.microsoft.com/office/drawing/2014/main" id="{AAE51717-D929-47F8-A1A0-A8A2A6647E01}"/>
-              </a:ext>
-            </a:extLst>
-          </p:cNvPr>
-          <p:cNvPicPr>
-            <a:picLocks noChangeAspect="1"/>
-          </p:cNvPicPr>
-          <p:nvPr/>
-        </p:nvPicPr>
-        <p:blipFill>
-          <a:blip r:embed="rId2"/>
-          <a:stretch>
-            <a:fillRect/>
-          </a:stretch>
-        </p:blipFill>
-        <p:spPr>
-          <a:xfrm>
-            <a:off x="3883752" y="1155072"/>
-            <a:ext cx="6017004" cy="3914959"/>
-          </a:xfrm>
-          <a:prstGeom prst="rect">
-            <a:avLst/>
-          </a:prstGeom>
-        </p:spPr>
-      </p:pic>
-      <p:sp>
-        <p:nvSpPr>
-          <p:cNvPr id="5" name="Rectangle: Rounded Corners 4">
-            <a:extLst>
-              <a:ext uri="{FF2B5EF4-FFF2-40B4-BE49-F238E27FC236}">
-                <a16:creationId xmlns:a16="http://schemas.microsoft.com/office/drawing/2014/main" id="{28BE6658-195F-4253-B5D6-79E1AC3CAA8F}"/>
-              </a:ext>
-            </a:extLst>
-          </p:cNvPr>
-          <p:cNvSpPr/>
-          <p:nvPr/>
-        </p:nvSpPr>
-        <p:spPr>
-          <a:xfrm>
-            <a:off x="822570" y="5326183"/>
-            <a:ext cx="11078305" cy="1328614"/>
-          </a:xfrm>
-          <a:prstGeom prst="roundRect">
-            <a:avLst/>
-          </a:prstGeom>
-        </p:spPr>
-        <p:style>
-          <a:lnRef idx="2">
-            <a:schemeClr val="accent1">
-              <a:shade val="50000"/>
-            </a:schemeClr>
-          </a:lnRef>
-          <a:fillRef idx="1">
-            <a:schemeClr val="accent1"/>
-          </a:fillRef>
-          <a:effectRef idx="0">
-            <a:schemeClr val="accent1"/>
-          </a:effectRef>
-          <a:fontRef idx="minor">
-            <a:schemeClr val="lt1"/>
-          </a:fontRef>
-        </p:style>
-        <p:txBody>
-          <a:bodyPr rtlCol="0" anchor="ctr"/>
-          <a:lstStyle/>
-          <a:p>
-            <a:pPr algn="ctr"/>
-            <a:r>
-              <a:rPr lang="en-US" dirty="0" err="1">
-                <a:solidFill>
-                  <a:schemeClr val="accent4"/>
-                </a:solidFill>
-                <a:ea typeface="+mn-lt"/>
-                <a:cs typeface="+mn-lt"/>
-              </a:rPr>
-              <a:t>Объе́ктно-ориенти́рованное</a:t>
-            </a:r>
-            <a:r>
-              <a:rPr lang="en-US" dirty="0">
-                <a:solidFill>
-                  <a:schemeClr val="accent4"/>
-                </a:solidFill>
-                <a:ea typeface="+mn-lt"/>
-                <a:cs typeface="+mn-lt"/>
-              </a:rPr>
-              <a:t> </a:t>
-            </a:r>
-            <a:r>
-              <a:rPr lang="en-US" dirty="0" err="1">
-                <a:solidFill>
-                  <a:schemeClr val="accent4"/>
-                </a:solidFill>
-                <a:ea typeface="+mn-lt"/>
-                <a:cs typeface="+mn-lt"/>
-              </a:rPr>
-              <a:t>программи́рование</a:t>
-            </a:r>
-            <a:r>
-              <a:rPr lang="en-US" dirty="0">
-                <a:solidFill>
-                  <a:schemeClr val="accent4"/>
-                </a:solidFill>
-                <a:ea typeface="+mn-lt"/>
-                <a:cs typeface="+mn-lt"/>
-              </a:rPr>
-              <a:t> </a:t>
-            </a:r>
-            <a:r>
-              <a:rPr lang="en-US" dirty="0">
-                <a:ea typeface="+mn-lt"/>
-                <a:cs typeface="+mn-lt"/>
-              </a:rPr>
-              <a:t>— </a:t>
-            </a:r>
-            <a:r>
-              <a:rPr lang="en-US" dirty="0" err="1">
-                <a:ea typeface="+mn-lt"/>
-                <a:cs typeface="+mn-lt"/>
-              </a:rPr>
-              <a:t>методология</a:t>
-            </a:r>
-            <a:r>
-              <a:rPr lang="en-US" dirty="0">
-                <a:ea typeface="+mn-lt"/>
-                <a:cs typeface="+mn-lt"/>
-              </a:rPr>
-              <a:t> </a:t>
-            </a:r>
-            <a:r>
-              <a:rPr lang="en-US" dirty="0" err="1">
-                <a:ea typeface="+mn-lt"/>
-                <a:cs typeface="+mn-lt"/>
-              </a:rPr>
-              <a:t>программирования</a:t>
-            </a:r>
-            <a:r>
-              <a:rPr lang="en-US" dirty="0">
-                <a:ea typeface="+mn-lt"/>
-                <a:cs typeface="+mn-lt"/>
-              </a:rPr>
-              <a:t>, </a:t>
-            </a:r>
-            <a:r>
-              <a:rPr lang="en-US" dirty="0" err="1">
-                <a:ea typeface="+mn-lt"/>
-                <a:cs typeface="+mn-lt"/>
-              </a:rPr>
-              <a:t>основанная</a:t>
-            </a:r>
-            <a:r>
-              <a:rPr lang="en-US" dirty="0">
-                <a:ea typeface="+mn-lt"/>
-                <a:cs typeface="+mn-lt"/>
-              </a:rPr>
-              <a:t> </a:t>
-            </a:r>
-            <a:r>
-              <a:rPr lang="en-US" dirty="0" err="1">
-                <a:ea typeface="+mn-lt"/>
-                <a:cs typeface="+mn-lt"/>
-              </a:rPr>
-              <a:t>на</a:t>
-            </a:r>
-            <a:r>
-              <a:rPr lang="en-US" dirty="0">
-                <a:ea typeface="+mn-lt"/>
-                <a:cs typeface="+mn-lt"/>
-              </a:rPr>
-              <a:t> </a:t>
-            </a:r>
-            <a:r>
-              <a:rPr lang="en-US" dirty="0" err="1">
-                <a:ea typeface="+mn-lt"/>
-                <a:cs typeface="+mn-lt"/>
-              </a:rPr>
-              <a:t>представлении</a:t>
-            </a:r>
-            <a:r>
-              <a:rPr lang="en-US" dirty="0">
-                <a:ea typeface="+mn-lt"/>
-                <a:cs typeface="+mn-lt"/>
-              </a:rPr>
-              <a:t> </a:t>
-            </a:r>
-            <a:r>
-              <a:rPr lang="en-US" dirty="0" err="1">
-                <a:ea typeface="+mn-lt"/>
-                <a:cs typeface="+mn-lt"/>
-              </a:rPr>
-              <a:t>программы</a:t>
-            </a:r>
-            <a:r>
-              <a:rPr lang="en-US" dirty="0">
-                <a:ea typeface="+mn-lt"/>
-                <a:cs typeface="+mn-lt"/>
-              </a:rPr>
-              <a:t> в </a:t>
-            </a:r>
-            <a:r>
-              <a:rPr lang="en-US" dirty="0" err="1">
-                <a:ea typeface="+mn-lt"/>
-                <a:cs typeface="+mn-lt"/>
-              </a:rPr>
-              <a:t>виде</a:t>
-            </a:r>
-            <a:r>
-              <a:rPr lang="en-US" dirty="0">
-                <a:ea typeface="+mn-lt"/>
-                <a:cs typeface="+mn-lt"/>
-              </a:rPr>
-              <a:t> </a:t>
-            </a:r>
-            <a:r>
-              <a:rPr lang="en-US" dirty="0" err="1">
-                <a:ea typeface="+mn-lt"/>
-                <a:cs typeface="+mn-lt"/>
-              </a:rPr>
-              <a:t>совокупности</a:t>
-            </a:r>
-            <a:r>
-              <a:rPr lang="en-US" dirty="0">
-                <a:ea typeface="+mn-lt"/>
-                <a:cs typeface="+mn-lt"/>
-              </a:rPr>
-              <a:t> </a:t>
-            </a:r>
-            <a:r>
-              <a:rPr lang="en-US" dirty="0" err="1">
-                <a:ea typeface="+mn-lt"/>
-                <a:cs typeface="+mn-lt"/>
-              </a:rPr>
-              <a:t>объектов</a:t>
-            </a:r>
-            <a:r>
-              <a:rPr lang="en-US" dirty="0">
-                <a:ea typeface="+mn-lt"/>
-                <a:cs typeface="+mn-lt"/>
-              </a:rPr>
-              <a:t>, </a:t>
-            </a:r>
-            <a:r>
-              <a:rPr lang="en-US" dirty="0" err="1">
-                <a:ea typeface="+mn-lt"/>
-                <a:cs typeface="+mn-lt"/>
-              </a:rPr>
-              <a:t>каждый</a:t>
-            </a:r>
-            <a:r>
-              <a:rPr lang="en-US" dirty="0">
-                <a:ea typeface="+mn-lt"/>
-                <a:cs typeface="+mn-lt"/>
-              </a:rPr>
-              <a:t> </a:t>
-            </a:r>
-            <a:r>
-              <a:rPr lang="en-US" dirty="0" err="1">
-                <a:ea typeface="+mn-lt"/>
-                <a:cs typeface="+mn-lt"/>
-              </a:rPr>
-              <a:t>из</a:t>
-            </a:r>
-            <a:r>
-              <a:rPr lang="en-US" dirty="0">
-                <a:ea typeface="+mn-lt"/>
-                <a:cs typeface="+mn-lt"/>
-              </a:rPr>
-              <a:t> </a:t>
-            </a:r>
-            <a:r>
-              <a:rPr lang="en-US" dirty="0" err="1">
-                <a:ea typeface="+mn-lt"/>
-                <a:cs typeface="+mn-lt"/>
-              </a:rPr>
-              <a:t>которых</a:t>
-            </a:r>
-            <a:r>
-              <a:rPr lang="en-US" dirty="0">
-                <a:ea typeface="+mn-lt"/>
-                <a:cs typeface="+mn-lt"/>
-              </a:rPr>
-              <a:t> </a:t>
-            </a:r>
-            <a:r>
-              <a:rPr lang="en-US" dirty="0" err="1">
-                <a:ea typeface="+mn-lt"/>
-                <a:cs typeface="+mn-lt"/>
-              </a:rPr>
-              <a:t>является</a:t>
-            </a:r>
-            <a:r>
-              <a:rPr lang="en-US" dirty="0">
-                <a:ea typeface="+mn-lt"/>
-                <a:cs typeface="+mn-lt"/>
-              </a:rPr>
-              <a:t> </a:t>
-            </a:r>
-            <a:r>
-              <a:rPr lang="en-US" dirty="0" err="1">
-                <a:ea typeface="+mn-lt"/>
-                <a:cs typeface="+mn-lt"/>
-              </a:rPr>
-              <a:t>экземпляром</a:t>
-            </a:r>
-            <a:r>
-              <a:rPr lang="en-US" dirty="0">
-                <a:ea typeface="+mn-lt"/>
-                <a:cs typeface="+mn-lt"/>
-              </a:rPr>
-              <a:t> </a:t>
-            </a:r>
-            <a:r>
-              <a:rPr lang="en-US" dirty="0" err="1">
-                <a:ea typeface="+mn-lt"/>
-                <a:cs typeface="+mn-lt"/>
-              </a:rPr>
-              <a:t>определённого</a:t>
-            </a:r>
-            <a:r>
-              <a:rPr lang="en-US" dirty="0">
-                <a:ea typeface="+mn-lt"/>
-                <a:cs typeface="+mn-lt"/>
-              </a:rPr>
-              <a:t> </a:t>
-            </a:r>
-            <a:r>
-              <a:rPr lang="en-US" dirty="0" err="1">
-                <a:ea typeface="+mn-lt"/>
-                <a:cs typeface="+mn-lt"/>
-              </a:rPr>
-              <a:t>класса</a:t>
-            </a:r>
-            <a:r>
-              <a:rPr lang="en-US" dirty="0">
-                <a:ea typeface="+mn-lt"/>
-                <a:cs typeface="+mn-lt"/>
-              </a:rPr>
-              <a:t>, а </a:t>
-            </a:r>
-            <a:r>
-              <a:rPr lang="en-US" dirty="0" err="1">
-                <a:ea typeface="+mn-lt"/>
-                <a:cs typeface="+mn-lt"/>
-              </a:rPr>
-              <a:t>классы</a:t>
-            </a:r>
-            <a:r>
-              <a:rPr lang="en-US" dirty="0">
-                <a:ea typeface="+mn-lt"/>
-                <a:cs typeface="+mn-lt"/>
-              </a:rPr>
-              <a:t> </a:t>
-            </a:r>
-            <a:r>
-              <a:rPr lang="en-US" dirty="0" err="1">
-                <a:ea typeface="+mn-lt"/>
-                <a:cs typeface="+mn-lt"/>
-              </a:rPr>
-              <a:t>образуют</a:t>
-            </a:r>
-            <a:r>
-              <a:rPr lang="en-US" dirty="0">
-                <a:ea typeface="+mn-lt"/>
-                <a:cs typeface="+mn-lt"/>
-              </a:rPr>
-              <a:t> </a:t>
-            </a:r>
-            <a:r>
-              <a:rPr lang="en-US" dirty="0" err="1">
-                <a:ea typeface="+mn-lt"/>
-                <a:cs typeface="+mn-lt"/>
-              </a:rPr>
-              <a:t>иерархию</a:t>
-            </a:r>
-            <a:r>
-              <a:rPr lang="en-US" dirty="0">
-                <a:ea typeface="+mn-lt"/>
-                <a:cs typeface="+mn-lt"/>
-              </a:rPr>
-              <a:t> </a:t>
-            </a:r>
-            <a:r>
-              <a:rPr lang="en-US" dirty="0" err="1">
-                <a:ea typeface="+mn-lt"/>
-                <a:cs typeface="+mn-lt"/>
-              </a:rPr>
-              <a:t>наследования</a:t>
-            </a:r>
-            <a:r>
-              <a:rPr lang="en-US" dirty="0">
-                <a:ea typeface="+mn-lt"/>
-                <a:cs typeface="+mn-lt"/>
-              </a:rPr>
-              <a:t>.</a:t>
-            </a:r>
-            <a:endParaRPr lang="en-US" dirty="0"/>
-          </a:p>
-        </p:txBody>
-      </p:sp>
-    </p:spTree>
-    <p:extLst>
-      <p:ext uri="{BB962C8B-B14F-4D97-AF65-F5344CB8AC3E}">
-        <p14:creationId xmlns:p14="http://schemas.microsoft.com/office/powerpoint/2010/main" val="559518035"/>
-      </p:ext>
-    </p:extLst>
-  </p:cSld>
-  <p:clrMapOvr>
-    <a:masterClrMapping/>
-  </p:clrMapOvr>
-</p:sld>
-</file>
-
-<file path=ppt/slides/slide14.xml><?xml version="1.0" encoding="utf-8"?>
-<p:sld xmlns:a="http://schemas.openxmlformats.org/drawingml/2006/main" xmlns:r="http://schemas.openxmlformats.org/officeDocument/2006/relationships" xmlns:p="http://schemas.openxmlformats.org/presentationml/2006/main">
-  <p:cSld>
-    <p:spTree>
-      <p:nvGrpSpPr>
-        <p:cNvPr id="1" name=""/>
-        <p:cNvGrpSpPr/>
-        <p:nvPr/>
-      </p:nvGrpSpPr>
-      <p:grpSpPr>
-        <a:xfrm>
-          <a:off x="0" y="0"/>
-          <a:ext cx="0" cy="0"/>
-          <a:chOff x="0" y="0"/>
-          <a:chExt cx="0" cy="0"/>
-        </a:xfrm>
-      </p:grpSpPr>
-      <p:sp>
-        <p:nvSpPr>
-          <p:cNvPr id="3" name="Прямоугольник 4">
-            <a:extLst>
-              <a:ext uri="{FF2B5EF4-FFF2-40B4-BE49-F238E27FC236}">
-                <a16:creationId xmlns:a16="http://schemas.microsoft.com/office/drawing/2014/main" id="{36CC0B9C-0EBE-4A1E-B58D-B636BD15693B}"/>
-              </a:ext>
-            </a:extLst>
-          </p:cNvPr>
-          <p:cNvSpPr/>
-          <p:nvPr/>
-        </p:nvSpPr>
-        <p:spPr>
-          <a:xfrm>
-            <a:off x="569167" y="242596"/>
-            <a:ext cx="11150082" cy="811763"/>
-          </a:xfrm>
-          <a:prstGeom prst="rect">
-            <a:avLst/>
-          </a:prstGeom>
-        </p:spPr>
-        <p:style>
-          <a:lnRef idx="2">
-            <a:schemeClr val="accent1">
-              <a:shade val="50000"/>
-            </a:schemeClr>
-          </a:lnRef>
-          <a:fillRef idx="1">
-            <a:schemeClr val="accent1"/>
-          </a:fillRef>
-          <a:effectRef idx="0">
-            <a:schemeClr val="accent1"/>
-          </a:effectRef>
-          <a:fontRef idx="minor">
-            <a:schemeClr val="lt1"/>
-          </a:fontRef>
-        </p:style>
-        <p:txBody>
-          <a:bodyPr lIns="91440" tIns="45720" rIns="91440" bIns="45720" rtlCol="0" anchor="ctr"/>
-          <a:lstStyle/>
-          <a:p>
-            <a:pPr algn="ctr"/>
-            <a:r>
-              <a:rPr lang="ru-RU" sz="3200" b="1" dirty="0">
-                <a:ln w="12700" cmpd="sng">
-                  <a:solidFill>
-                    <a:srgbClr val="FFC000"/>
-                  </a:solidFill>
-                  <a:prstDash val="solid"/>
-                </a:ln>
-                <a:solidFill>
-                  <a:srgbClr val="FFC000"/>
-                </a:solidFill>
-                <a:ea typeface="+mn-lt"/>
-                <a:cs typeface="+mn-lt"/>
-              </a:rPr>
-              <a:t>Self</a:t>
-            </a:r>
-            <a:endParaRPr lang="ru-RU" sz="3200" b="1" dirty="0">
-              <a:ln w="12700" cmpd="sng">
-                <a:solidFill>
-                  <a:srgbClr val="FFC000"/>
-                </a:solidFill>
-                <a:prstDash val="solid"/>
-              </a:ln>
-              <a:solidFill>
-                <a:srgbClr val="FFC000"/>
-              </a:solidFill>
-              <a:cs typeface="Calibri"/>
-            </a:endParaRPr>
-          </a:p>
-        </p:txBody>
-      </p:sp>
-      <p:sp>
-        <p:nvSpPr>
-          <p:cNvPr id="2" name="Rectangle: Rounded Corners 1">
-            <a:extLst>
-              <a:ext uri="{FF2B5EF4-FFF2-40B4-BE49-F238E27FC236}">
-                <a16:creationId xmlns:a16="http://schemas.microsoft.com/office/drawing/2014/main" id="{EEA95EDD-2671-44AD-8123-129B06B9D4EC}"/>
-              </a:ext>
-            </a:extLst>
-          </p:cNvPr>
-          <p:cNvSpPr/>
-          <p:nvPr/>
-        </p:nvSpPr>
-        <p:spPr>
-          <a:xfrm>
-            <a:off x="2357575" y="5586368"/>
-            <a:ext cx="7873999" cy="537307"/>
-          </a:xfrm>
-          <a:prstGeom prst="roundRect">
-            <a:avLst/>
-          </a:prstGeom>
-        </p:spPr>
-        <p:style>
-          <a:lnRef idx="2">
-            <a:schemeClr val="accent1">
-              <a:shade val="50000"/>
-            </a:schemeClr>
-          </a:lnRef>
-          <a:fillRef idx="1">
-            <a:schemeClr val="accent1"/>
-          </a:fillRef>
-          <a:effectRef idx="0">
-            <a:schemeClr val="accent1"/>
-          </a:effectRef>
-          <a:fontRef idx="minor">
-            <a:schemeClr val="lt1"/>
-          </a:fontRef>
-        </p:style>
-        <p:txBody>
-          <a:bodyPr rtlCol="0" anchor="ctr"/>
-          <a:lstStyle/>
-          <a:p>
-            <a:pPr algn="ctr"/>
-            <a:r>
-              <a:rPr lang="en-US" dirty="0">
-                <a:solidFill>
-                  <a:schemeClr val="accent4"/>
-                </a:solidFill>
-                <a:ea typeface="+mn-lt"/>
-                <a:cs typeface="+mn-lt"/>
-              </a:rPr>
-              <a:t>Self </a:t>
-            </a:r>
-            <a:r>
-              <a:rPr lang="en-US" dirty="0">
-                <a:ea typeface="+mn-lt"/>
-                <a:cs typeface="+mn-lt"/>
-              </a:rPr>
-              <a:t>- </a:t>
-            </a:r>
-            <a:r>
-              <a:rPr lang="en-US" dirty="0" err="1">
-                <a:ea typeface="+mn-lt"/>
-                <a:cs typeface="+mn-lt"/>
-              </a:rPr>
-              <a:t>имя</a:t>
-            </a:r>
-            <a:r>
-              <a:rPr lang="en-US" dirty="0">
-                <a:ea typeface="+mn-lt"/>
-                <a:cs typeface="+mn-lt"/>
-              </a:rPr>
-              <a:t> </a:t>
-            </a:r>
-            <a:r>
-              <a:rPr lang="en-US" dirty="0" err="1">
-                <a:ea typeface="+mn-lt"/>
-                <a:cs typeface="+mn-lt"/>
-              </a:rPr>
-              <a:t>для</a:t>
-            </a:r>
-            <a:r>
-              <a:rPr lang="en-US" dirty="0">
-                <a:ea typeface="+mn-lt"/>
-                <a:cs typeface="+mn-lt"/>
-              </a:rPr>
-              <a:t> </a:t>
-            </a:r>
-            <a:r>
-              <a:rPr lang="en-US" dirty="0" err="1">
-                <a:ea typeface="+mn-lt"/>
-                <a:cs typeface="+mn-lt"/>
-              </a:rPr>
-              <a:t>аргумента</a:t>
-            </a:r>
-            <a:r>
-              <a:rPr lang="en-US" dirty="0">
-                <a:ea typeface="+mn-lt"/>
-                <a:cs typeface="+mn-lt"/>
-              </a:rPr>
-              <a:t>, </a:t>
-            </a:r>
-            <a:r>
-              <a:rPr lang="en-US" dirty="0" err="1">
-                <a:ea typeface="+mn-lt"/>
-                <a:cs typeface="+mn-lt"/>
-              </a:rPr>
-              <a:t>представляющего</a:t>
-            </a:r>
-            <a:r>
-              <a:rPr lang="en-US" dirty="0">
-                <a:ea typeface="+mn-lt"/>
-                <a:cs typeface="+mn-lt"/>
-              </a:rPr>
-              <a:t> </a:t>
-            </a:r>
-            <a:r>
-              <a:rPr lang="en-US" dirty="0" err="1">
-                <a:ea typeface="+mn-lt"/>
-                <a:cs typeface="+mn-lt"/>
-              </a:rPr>
-              <a:t>текущий</a:t>
-            </a:r>
-            <a:r>
-              <a:rPr lang="en-US" dirty="0">
-                <a:ea typeface="+mn-lt"/>
-                <a:cs typeface="+mn-lt"/>
-              </a:rPr>
-              <a:t> </a:t>
-            </a:r>
-            <a:r>
-              <a:rPr lang="en-US" dirty="0" err="1">
-                <a:ea typeface="+mn-lt"/>
-                <a:cs typeface="+mn-lt"/>
-              </a:rPr>
-              <a:t>объект</a:t>
-            </a:r>
-            <a:r>
-              <a:rPr lang="en-US" dirty="0">
-                <a:ea typeface="+mn-lt"/>
-                <a:cs typeface="+mn-lt"/>
-              </a:rPr>
-              <a:t> </a:t>
-            </a:r>
-            <a:r>
-              <a:rPr lang="en-US" dirty="0" err="1">
-                <a:ea typeface="+mn-lt"/>
-                <a:cs typeface="+mn-lt"/>
-              </a:rPr>
-              <a:t>класса</a:t>
-            </a:r>
-            <a:endParaRPr lang="en-US" dirty="0" err="1">
-              <a:cs typeface="Calibri" panose="020F0502020204030204"/>
-            </a:endParaRPr>
-          </a:p>
-        </p:txBody>
-      </p:sp>
-      <p:sp>
-        <p:nvSpPr>
-          <p:cNvPr id="4" name="TextBox 3">
-            <a:extLst>
-              <a:ext uri="{FF2B5EF4-FFF2-40B4-BE49-F238E27FC236}">
-                <a16:creationId xmlns:a16="http://schemas.microsoft.com/office/drawing/2014/main" id="{0A67E701-860F-4F89-AC91-14FED252D43B}"/>
-              </a:ext>
-            </a:extLst>
-          </p:cNvPr>
-          <p:cNvSpPr txBox="1"/>
-          <p:nvPr/>
-        </p:nvSpPr>
-        <p:spPr>
-          <a:xfrm>
-            <a:off x="2661160" y="1379164"/>
-            <a:ext cx="1375507" cy="338554"/>
-          </a:xfrm>
-          <a:prstGeom prst="rect">
-            <a:avLst/>
-          </a:prstGeom>
-          <a:noFill/>
-        </p:spPr>
-        <p:txBody>
-          <a:bodyPr rot="0" spcFirstLastPara="0" vertOverflow="overflow" horzOverflow="overflow" vert="horz" wrap="square" lIns="91440" tIns="45720" rIns="91440" bIns="45720" numCol="1" spcCol="0" rtlCol="0" fromWordArt="0" anchor="t" anchorCtr="0" forceAA="0" compatLnSpc="1">
-            <a:prstTxWarp prst="textNoShape">
-              <a:avLst/>
-            </a:prstTxWarp>
-            <a:spAutoFit/>
-          </a:bodyPr>
-          <a:lstStyle/>
-          <a:p>
-            <a:r>
-              <a:rPr lang="en-US" sz="1600" dirty="0" err="1">
-                <a:cs typeface="Calibri"/>
-              </a:rPr>
-              <a:t>Класс</a:t>
-            </a:r>
-            <a:r>
-              <a:rPr lang="en-US" sz="1600" dirty="0">
-                <a:cs typeface="Calibri"/>
-              </a:rPr>
-              <a:t> </a:t>
-            </a:r>
-          </a:p>
-        </p:txBody>
-      </p:sp>
-      <p:sp>
-        <p:nvSpPr>
-          <p:cNvPr id="10" name="Rectangle: Rounded Corners 9">
-            <a:extLst>
-              <a:ext uri="{FF2B5EF4-FFF2-40B4-BE49-F238E27FC236}">
-                <a16:creationId xmlns:a16="http://schemas.microsoft.com/office/drawing/2014/main" id="{1CED3564-D187-42FE-A1B2-636E49525386}"/>
-              </a:ext>
-            </a:extLst>
-          </p:cNvPr>
-          <p:cNvSpPr/>
-          <p:nvPr/>
-        </p:nvSpPr>
-        <p:spPr>
-          <a:xfrm>
-            <a:off x="2069783" y="1763970"/>
-            <a:ext cx="1787768" cy="742461"/>
-          </a:xfrm>
-          <a:prstGeom prst="roundRect">
-            <a:avLst/>
-          </a:prstGeom>
-        </p:spPr>
-        <p:style>
-          <a:lnRef idx="2">
-            <a:schemeClr val="accent1">
-              <a:shade val="50000"/>
-            </a:schemeClr>
-          </a:lnRef>
-          <a:fillRef idx="1">
-            <a:schemeClr val="accent1"/>
-          </a:fillRef>
-          <a:effectRef idx="0">
-            <a:schemeClr val="accent1"/>
-          </a:effectRef>
-          <a:fontRef idx="minor">
-            <a:schemeClr val="lt1"/>
-          </a:fontRef>
-        </p:style>
-        <p:txBody>
-          <a:bodyPr lIns="91440" tIns="45720" rIns="91440" bIns="45720" rtlCol="0" anchor="ctr"/>
-          <a:lstStyle/>
-          <a:p>
-            <a:pPr algn="ctr"/>
-            <a:r>
-              <a:rPr lang="en-US" sz="2800" b="1" dirty="0" err="1">
-                <a:solidFill>
-                  <a:schemeClr val="accent4"/>
-                </a:solidFill>
-                <a:cs typeface="Calibri"/>
-              </a:rPr>
-              <a:t>MyClass</a:t>
-            </a:r>
-            <a:endParaRPr lang="en-US" sz="2800" b="1">
-              <a:solidFill>
-                <a:schemeClr val="accent4"/>
-              </a:solidFill>
-              <a:cs typeface="Calibri"/>
-            </a:endParaRPr>
-          </a:p>
-        </p:txBody>
-      </p:sp>
-      <p:sp>
-        <p:nvSpPr>
-          <p:cNvPr id="11" name="TextBox 10">
-            <a:extLst>
-              <a:ext uri="{FF2B5EF4-FFF2-40B4-BE49-F238E27FC236}">
-                <a16:creationId xmlns:a16="http://schemas.microsoft.com/office/drawing/2014/main" id="{2E7EFCB7-B362-4A0F-959E-4981F11BFEAA}"/>
-              </a:ext>
-            </a:extLst>
-          </p:cNvPr>
-          <p:cNvSpPr txBox="1"/>
-          <p:nvPr/>
-        </p:nvSpPr>
-        <p:spPr>
-          <a:xfrm>
-            <a:off x="4222380" y="3563638"/>
-            <a:ext cx="2264507" cy="338554"/>
-          </a:xfrm>
-          <a:prstGeom prst="rect">
-            <a:avLst/>
-          </a:prstGeom>
-          <a:noFill/>
-        </p:spPr>
-        <p:txBody>
-          <a:bodyPr rot="0" spcFirstLastPara="0" vertOverflow="overflow" horzOverflow="overflow" vert="horz" wrap="square" lIns="91440" tIns="45720" rIns="91440" bIns="45720" numCol="1" spcCol="0" rtlCol="0" fromWordArt="0" anchor="t" anchorCtr="0" forceAA="0" compatLnSpc="1">
-            <a:prstTxWarp prst="textNoShape">
-              <a:avLst/>
-            </a:prstTxWarp>
-            <a:spAutoFit/>
-          </a:bodyPr>
-          <a:lstStyle/>
-          <a:p>
-            <a:r>
-              <a:rPr lang="en-US" sz="1600" dirty="0" err="1">
-                <a:cs typeface="Calibri"/>
-              </a:rPr>
-              <a:t>Экземпляр</a:t>
-            </a:r>
-            <a:r>
-              <a:rPr lang="en-US" sz="1600" dirty="0">
-                <a:cs typeface="Calibri"/>
-              </a:rPr>
-              <a:t> </a:t>
-            </a:r>
-            <a:r>
-              <a:rPr lang="en-US" sz="1600" dirty="0" err="1">
-                <a:cs typeface="Calibri"/>
-              </a:rPr>
-              <a:t>класса</a:t>
-            </a:r>
-            <a:endParaRPr lang="en-US" sz="1600" dirty="0">
-              <a:cs typeface="Calibri"/>
-            </a:endParaRPr>
-          </a:p>
-        </p:txBody>
-      </p:sp>
-      <p:sp>
-        <p:nvSpPr>
-          <p:cNvPr id="12" name="Rectangle: Rounded Corners 11">
-            <a:extLst>
-              <a:ext uri="{FF2B5EF4-FFF2-40B4-BE49-F238E27FC236}">
-                <a16:creationId xmlns:a16="http://schemas.microsoft.com/office/drawing/2014/main" id="{049A6547-CB20-4C97-98B6-F73EA8B91D3E}"/>
-              </a:ext>
-            </a:extLst>
-          </p:cNvPr>
-          <p:cNvSpPr/>
-          <p:nvPr/>
-        </p:nvSpPr>
-        <p:spPr>
-          <a:xfrm>
-            <a:off x="4219260" y="4045271"/>
-            <a:ext cx="1787768" cy="654538"/>
-          </a:xfrm>
-          <a:prstGeom prst="roundRect">
-            <a:avLst/>
-          </a:prstGeom>
-        </p:spPr>
-        <p:style>
-          <a:lnRef idx="2">
-            <a:schemeClr val="accent1">
-              <a:shade val="50000"/>
-            </a:schemeClr>
-          </a:lnRef>
-          <a:fillRef idx="1">
-            <a:schemeClr val="accent1"/>
-          </a:fillRef>
-          <a:effectRef idx="0">
-            <a:schemeClr val="accent1"/>
-          </a:effectRef>
-          <a:fontRef idx="minor">
-            <a:schemeClr val="lt1"/>
-          </a:fontRef>
-        </p:style>
-        <p:txBody>
-          <a:bodyPr lIns="91440" tIns="45720" rIns="91440" bIns="45720" rtlCol="0" anchor="ctr"/>
-          <a:lstStyle/>
-          <a:p>
-            <a:pPr algn="ctr"/>
-            <a:r>
-              <a:rPr lang="en-US" sz="2400" b="1" dirty="0" err="1">
-                <a:solidFill>
-                  <a:schemeClr val="accent4"/>
-                </a:solidFill>
-                <a:cs typeface="Calibri"/>
-              </a:rPr>
-              <a:t>myobject</a:t>
-            </a:r>
-            <a:endParaRPr lang="en-US" sz="2400" b="1">
-              <a:solidFill>
-                <a:schemeClr val="accent4"/>
-              </a:solidFill>
-              <a:cs typeface="Calibri"/>
-            </a:endParaRPr>
-          </a:p>
-        </p:txBody>
-      </p:sp>
-      <p:sp>
-        <p:nvSpPr>
-          <p:cNvPr id="13" name="Arrow: Down 12">
-            <a:extLst>
-              <a:ext uri="{FF2B5EF4-FFF2-40B4-BE49-F238E27FC236}">
-                <a16:creationId xmlns:a16="http://schemas.microsoft.com/office/drawing/2014/main" id="{ECE1A9CB-957A-4C8C-805B-BA7467C0FE96}"/>
-              </a:ext>
-            </a:extLst>
-          </p:cNvPr>
-          <p:cNvSpPr/>
-          <p:nvPr/>
-        </p:nvSpPr>
-        <p:spPr>
-          <a:xfrm rot="-1680000">
-            <a:off x="3898540" y="2640468"/>
-            <a:ext cx="363069" cy="726139"/>
-          </a:xfrm>
-          <a:prstGeom prst="downArrow">
-            <a:avLst/>
-          </a:prstGeom>
-          <a:solidFill>
-            <a:schemeClr val="accent4"/>
-          </a:solidFill>
-          <a:ln>
-            <a:noFill/>
-          </a:ln>
-        </p:spPr>
-        <p:style>
-          <a:lnRef idx="2">
-            <a:schemeClr val="accent1">
-              <a:shade val="50000"/>
-            </a:schemeClr>
-          </a:lnRef>
-          <a:fillRef idx="1">
-            <a:schemeClr val="accent1"/>
-          </a:fillRef>
-          <a:effectRef idx="0">
-            <a:schemeClr val="accent1"/>
-          </a:effectRef>
-          <a:fontRef idx="minor">
-            <a:schemeClr val="lt1"/>
-          </a:fontRef>
-        </p:style>
-        <p:txBody>
-          <a:bodyPr rtlCol="0" anchor="ctr"/>
-          <a:lstStyle/>
-          <a:p>
-            <a:pPr algn="ctr"/>
-            <a:endParaRPr lang="en-US"/>
-          </a:p>
-        </p:txBody>
-      </p:sp>
-      <p:sp>
-        <p:nvSpPr>
-          <p:cNvPr id="7" name="Rectangle 6">
-            <a:extLst>
-              <a:ext uri="{FF2B5EF4-FFF2-40B4-BE49-F238E27FC236}">
-                <a16:creationId xmlns:a16="http://schemas.microsoft.com/office/drawing/2014/main" id="{5DBE1E1A-DE2F-49A2-B06D-C941F62346E0}"/>
-              </a:ext>
-            </a:extLst>
-          </p:cNvPr>
-          <p:cNvSpPr/>
-          <p:nvPr/>
-        </p:nvSpPr>
-        <p:spPr>
-          <a:xfrm>
-            <a:off x="7415996" y="3803729"/>
-            <a:ext cx="3462758" cy="607672"/>
-          </a:xfrm>
-          <a:prstGeom prst="rect">
-            <a:avLst/>
-          </a:prstGeom>
-        </p:spPr>
-        <p:style>
-          <a:lnRef idx="2">
-            <a:schemeClr val="accent1">
-              <a:shade val="50000"/>
-            </a:schemeClr>
-          </a:lnRef>
-          <a:fillRef idx="1">
-            <a:schemeClr val="accent1"/>
-          </a:fillRef>
-          <a:effectRef idx="0">
-            <a:schemeClr val="accent1"/>
-          </a:effectRef>
-          <a:fontRef idx="minor">
-            <a:schemeClr val="lt1"/>
-          </a:fontRef>
-        </p:style>
-        <p:txBody>
-          <a:bodyPr rtlCol="0" anchor="ctr"/>
-          <a:lstStyle/>
-          <a:p>
-            <a:pPr algn="ctr"/>
-            <a:r>
-              <a:rPr lang="en-US" b="1" dirty="0" err="1">
-                <a:solidFill>
-                  <a:schemeClr val="accent4"/>
-                </a:solidFill>
-                <a:ea typeface="+mn-lt"/>
-                <a:cs typeface="+mn-lt"/>
-              </a:rPr>
-              <a:t>myobject.method</a:t>
-            </a:r>
-            <a:r>
-              <a:rPr lang="en-US" b="1" dirty="0">
-                <a:solidFill>
-                  <a:schemeClr val="accent4"/>
-                </a:solidFill>
-                <a:ea typeface="+mn-lt"/>
-                <a:cs typeface="+mn-lt"/>
-              </a:rPr>
-              <a:t>(arg1, arg2)</a:t>
-            </a:r>
-            <a:endParaRPr lang="en-US" b="1">
-              <a:solidFill>
-                <a:schemeClr val="accent4"/>
-              </a:solidFill>
-              <a:cs typeface="Calibri"/>
-            </a:endParaRPr>
-          </a:p>
-        </p:txBody>
-      </p:sp>
-      <p:sp>
-        <p:nvSpPr>
-          <p:cNvPr id="14" name="Rectangle 13">
-            <a:extLst>
-              <a:ext uri="{FF2B5EF4-FFF2-40B4-BE49-F238E27FC236}">
-                <a16:creationId xmlns:a16="http://schemas.microsoft.com/office/drawing/2014/main" id="{3A523A32-B8DB-4500-A71E-0AAA05168DCD}"/>
-              </a:ext>
-            </a:extLst>
-          </p:cNvPr>
-          <p:cNvSpPr/>
-          <p:nvPr/>
-        </p:nvSpPr>
-        <p:spPr>
-          <a:xfrm>
-            <a:off x="6046325" y="1951779"/>
-            <a:ext cx="4253695" cy="607672"/>
-          </a:xfrm>
-          <a:prstGeom prst="rect">
-            <a:avLst/>
-          </a:prstGeom>
-        </p:spPr>
-        <p:style>
-          <a:lnRef idx="2">
-            <a:schemeClr val="accent1">
-              <a:shade val="50000"/>
-            </a:schemeClr>
-          </a:lnRef>
-          <a:fillRef idx="1">
-            <a:schemeClr val="accent1"/>
-          </a:fillRef>
-          <a:effectRef idx="0">
-            <a:schemeClr val="accent1"/>
-          </a:effectRef>
-          <a:fontRef idx="minor">
-            <a:schemeClr val="lt1"/>
-          </a:fontRef>
-        </p:style>
-        <p:txBody>
-          <a:bodyPr lIns="91440" tIns="45720" rIns="91440" bIns="45720" rtlCol="0" anchor="ctr"/>
-          <a:lstStyle/>
-          <a:p>
-            <a:pPr algn="ctr"/>
-            <a:r>
-              <a:rPr lang="en-US" b="1" dirty="0" err="1">
-                <a:solidFill>
-                  <a:schemeClr val="accent4"/>
-                </a:solidFill>
-                <a:ea typeface="+mn-lt"/>
-                <a:cs typeface="+mn-lt"/>
-              </a:rPr>
-              <a:t>MyClass.method</a:t>
-            </a:r>
-            <a:r>
-              <a:rPr lang="en-US" b="1" dirty="0">
-                <a:solidFill>
-                  <a:schemeClr val="accent4"/>
-                </a:solidFill>
-                <a:ea typeface="+mn-lt"/>
-                <a:cs typeface="+mn-lt"/>
-              </a:rPr>
-              <a:t>(</a:t>
-            </a:r>
-            <a:r>
-              <a:rPr lang="en-US" b="1" dirty="0" err="1">
-                <a:solidFill>
-                  <a:schemeClr val="accent4"/>
-                </a:solidFill>
-                <a:ea typeface="+mn-lt"/>
-                <a:cs typeface="+mn-lt"/>
-              </a:rPr>
-              <a:t>myobject</a:t>
-            </a:r>
-            <a:r>
-              <a:rPr lang="en-US" b="1" dirty="0">
-                <a:solidFill>
-                  <a:schemeClr val="accent4"/>
-                </a:solidFill>
-                <a:ea typeface="+mn-lt"/>
-                <a:cs typeface="+mn-lt"/>
-              </a:rPr>
-              <a:t>, arg1, arg2)</a:t>
-            </a:r>
-            <a:endParaRPr lang="en-US" b="1">
-              <a:solidFill>
-                <a:schemeClr val="accent4"/>
-              </a:solidFill>
-              <a:cs typeface="Calibri"/>
-            </a:endParaRPr>
-          </a:p>
-        </p:txBody>
-      </p:sp>
-      <p:sp>
-        <p:nvSpPr>
-          <p:cNvPr id="15" name="Arrow: Down 14">
-            <a:extLst>
-              <a:ext uri="{FF2B5EF4-FFF2-40B4-BE49-F238E27FC236}">
-                <a16:creationId xmlns:a16="http://schemas.microsoft.com/office/drawing/2014/main" id="{E78ADC4A-49BC-4010-9ED2-358337934ADA}"/>
-              </a:ext>
-            </a:extLst>
-          </p:cNvPr>
-          <p:cNvSpPr/>
-          <p:nvPr/>
-        </p:nvSpPr>
-        <p:spPr>
-          <a:xfrm rot="14820000">
-            <a:off x="6425679" y="3913683"/>
-            <a:ext cx="363069" cy="726139"/>
-          </a:xfrm>
-          <a:prstGeom prst="downArrow">
-            <a:avLst/>
-          </a:prstGeom>
-          <a:solidFill>
-            <a:schemeClr val="accent4"/>
-          </a:solidFill>
-          <a:ln>
-            <a:noFill/>
-          </a:ln>
-        </p:spPr>
-        <p:style>
-          <a:lnRef idx="2">
-            <a:schemeClr val="accent1">
-              <a:shade val="50000"/>
-            </a:schemeClr>
-          </a:lnRef>
-          <a:fillRef idx="1">
-            <a:schemeClr val="accent1"/>
-          </a:fillRef>
-          <a:effectRef idx="0">
-            <a:schemeClr val="accent1"/>
-          </a:effectRef>
-          <a:fontRef idx="minor">
-            <a:schemeClr val="lt1"/>
-          </a:fontRef>
-        </p:style>
-        <p:txBody>
-          <a:bodyPr rtlCol="0" anchor="ctr"/>
-          <a:lstStyle/>
-          <a:p>
-            <a:pPr algn="ctr"/>
-            <a:endParaRPr lang="en-US"/>
-          </a:p>
-        </p:txBody>
-      </p:sp>
-      <p:sp>
-        <p:nvSpPr>
-          <p:cNvPr id="16" name="Arrow: Down 15">
-            <a:extLst>
-              <a:ext uri="{FF2B5EF4-FFF2-40B4-BE49-F238E27FC236}">
-                <a16:creationId xmlns:a16="http://schemas.microsoft.com/office/drawing/2014/main" id="{CB098C8C-7D5C-4C0B-9F36-7BBBECF0930F}"/>
-              </a:ext>
-            </a:extLst>
-          </p:cNvPr>
-          <p:cNvSpPr/>
-          <p:nvPr/>
-        </p:nvSpPr>
-        <p:spPr>
-          <a:xfrm rot="8520000">
-            <a:off x="8354793" y="2746569"/>
-            <a:ext cx="363069" cy="726139"/>
-          </a:xfrm>
-          <a:prstGeom prst="downArrow">
-            <a:avLst/>
-          </a:prstGeom>
-          <a:solidFill>
-            <a:schemeClr val="accent4"/>
-          </a:solidFill>
-          <a:ln>
-            <a:noFill/>
-          </a:ln>
-        </p:spPr>
-        <p:style>
-          <a:lnRef idx="2">
-            <a:schemeClr val="accent1">
-              <a:shade val="50000"/>
-            </a:schemeClr>
-          </a:lnRef>
-          <a:fillRef idx="1">
-            <a:schemeClr val="accent1"/>
-          </a:fillRef>
-          <a:effectRef idx="0">
-            <a:schemeClr val="accent1"/>
-          </a:effectRef>
-          <a:fontRef idx="minor">
-            <a:schemeClr val="lt1"/>
-          </a:fontRef>
-        </p:style>
-        <p:txBody>
-          <a:bodyPr rtlCol="0" anchor="ctr"/>
-          <a:lstStyle/>
-          <a:p>
-            <a:pPr algn="ctr"/>
-            <a:endParaRPr lang="en-US"/>
-          </a:p>
-        </p:txBody>
-      </p:sp>
-      <p:sp>
-        <p:nvSpPr>
-          <p:cNvPr id="17" name="TextBox 16">
-            <a:extLst>
-              <a:ext uri="{FF2B5EF4-FFF2-40B4-BE49-F238E27FC236}">
-                <a16:creationId xmlns:a16="http://schemas.microsoft.com/office/drawing/2014/main" id="{F01555FA-512B-4324-A92C-E17676CDC13D}"/>
-              </a:ext>
-            </a:extLst>
-          </p:cNvPr>
-          <p:cNvSpPr txBox="1"/>
-          <p:nvPr/>
-        </p:nvSpPr>
-        <p:spPr>
-          <a:xfrm>
-            <a:off x="6527671" y="4586068"/>
-            <a:ext cx="2264507" cy="338554"/>
-          </a:xfrm>
-          <a:prstGeom prst="rect">
-            <a:avLst/>
-          </a:prstGeom>
-          <a:noFill/>
-        </p:spPr>
-        <p:txBody>
-          <a:bodyPr rot="0" spcFirstLastPara="0" vertOverflow="overflow" horzOverflow="overflow" vert="horz" wrap="square" lIns="91440" tIns="45720" rIns="91440" bIns="45720" numCol="1" spcCol="0" rtlCol="0" fromWordArt="0" anchor="t" anchorCtr="0" forceAA="0" compatLnSpc="1">
-            <a:prstTxWarp prst="textNoShape">
-              <a:avLst/>
-            </a:prstTxWarp>
-            <a:spAutoFit/>
-          </a:bodyPr>
-          <a:lstStyle/>
-          <a:p>
-            <a:r>
-              <a:rPr lang="en-US" sz="1600" dirty="0" err="1">
-                <a:cs typeface="Calibri"/>
-              </a:rPr>
-              <a:t>Вызов</a:t>
-            </a:r>
-            <a:r>
-              <a:rPr lang="en-US" sz="1600" dirty="0">
-                <a:cs typeface="Calibri"/>
-              </a:rPr>
-              <a:t> </a:t>
-            </a:r>
-            <a:r>
-              <a:rPr lang="en-US" sz="1600" dirty="0" err="1">
-                <a:cs typeface="Calibri"/>
-              </a:rPr>
-              <a:t>метода</a:t>
-            </a:r>
-            <a:endParaRPr lang="en-US" sz="1600" dirty="0">
-              <a:cs typeface="Calibri"/>
-            </a:endParaRPr>
-          </a:p>
-        </p:txBody>
-      </p:sp>
-      <p:sp>
-        <p:nvSpPr>
-          <p:cNvPr id="18" name="TextBox 17">
-            <a:extLst>
-              <a:ext uri="{FF2B5EF4-FFF2-40B4-BE49-F238E27FC236}">
-                <a16:creationId xmlns:a16="http://schemas.microsoft.com/office/drawing/2014/main" id="{3033BD01-0AF5-4BAD-B87A-5A3BE2F1EE88}"/>
-              </a:ext>
-            </a:extLst>
-          </p:cNvPr>
-          <p:cNvSpPr txBox="1"/>
-          <p:nvPr/>
-        </p:nvSpPr>
-        <p:spPr>
-          <a:xfrm>
-            <a:off x="8968000" y="2936675"/>
-            <a:ext cx="3142253" cy="338554"/>
-          </a:xfrm>
-          <a:prstGeom prst="rect">
-            <a:avLst/>
-          </a:prstGeom>
-          <a:noFill/>
-        </p:spPr>
-        <p:txBody>
-          <a:bodyPr rot="0" spcFirstLastPara="0" vertOverflow="overflow" horzOverflow="overflow" vert="horz" wrap="square" lIns="91440" tIns="45720" rIns="91440" bIns="45720" numCol="1" spcCol="0" rtlCol="0" fromWordArt="0" anchor="t" anchorCtr="0" forceAA="0" compatLnSpc="1">
-            <a:prstTxWarp prst="textNoShape">
-              <a:avLst/>
-            </a:prstTxWarp>
-            <a:spAutoFit/>
-          </a:bodyPr>
-          <a:lstStyle/>
-          <a:p>
-            <a:r>
-              <a:rPr lang="en-US" sz="1600" dirty="0" err="1">
-                <a:cs typeface="Calibri"/>
-              </a:rPr>
-              <a:t>Автоматическое</a:t>
-            </a:r>
-            <a:r>
-              <a:rPr lang="en-US" sz="1600" dirty="0">
-                <a:cs typeface="Calibri"/>
-              </a:rPr>
-              <a:t> </a:t>
-            </a:r>
-            <a:r>
-              <a:rPr lang="en-US" sz="1600" dirty="0" err="1">
-                <a:cs typeface="Calibri"/>
-              </a:rPr>
-              <a:t>преобразование</a:t>
-            </a:r>
-            <a:endParaRPr lang="en-US" sz="1600" dirty="0" err="1"/>
-          </a:p>
-        </p:txBody>
-      </p:sp>
-    </p:spTree>
-    <p:extLst>
-      <p:ext uri="{BB962C8B-B14F-4D97-AF65-F5344CB8AC3E}">
-        <p14:creationId xmlns:p14="http://schemas.microsoft.com/office/powerpoint/2010/main" val="3527025613"/>
-      </p:ext>
-    </p:extLst>
-  </p:cSld>
-  <p:clrMapOvr>
-    <a:masterClrMapping/>
-  </p:clrMapOvr>
-</p:sld>
-</file>
-
-<file path=ppt/slides/slide15.xml><?xml version="1.0" encoding="utf-8"?>
-<p:sld xmlns:a="http://schemas.openxmlformats.org/drawingml/2006/main" xmlns:r="http://schemas.openxmlformats.org/officeDocument/2006/relationships" xmlns:p="http://schemas.openxmlformats.org/presentationml/2006/main">
-  <p:cSld>
-    <p:spTree>
-      <p:nvGrpSpPr>
-        <p:cNvPr id="1" name=""/>
-        <p:cNvGrpSpPr/>
-        <p:nvPr/>
-      </p:nvGrpSpPr>
-      <p:grpSpPr>
-        <a:xfrm>
-          <a:off x="0" y="0"/>
-          <a:ext cx="0" cy="0"/>
-          <a:chOff x="0" y="0"/>
-          <a:chExt cx="0" cy="0"/>
-        </a:xfrm>
-      </p:grpSpPr>
-      <p:sp>
-        <p:nvSpPr>
-          <p:cNvPr id="3" name="Прямоугольник 4">
-            <a:extLst>
-              <a:ext uri="{FF2B5EF4-FFF2-40B4-BE49-F238E27FC236}">
-                <a16:creationId xmlns:a16="http://schemas.microsoft.com/office/drawing/2014/main" id="{36CC0B9C-0EBE-4A1E-B58D-B636BD15693B}"/>
-              </a:ext>
-            </a:extLst>
-          </p:cNvPr>
-          <p:cNvSpPr/>
-          <p:nvPr/>
-        </p:nvSpPr>
-        <p:spPr>
-          <a:xfrm>
-            <a:off x="569167" y="242596"/>
-            <a:ext cx="11150082" cy="811763"/>
-          </a:xfrm>
-          <a:prstGeom prst="rect">
-            <a:avLst/>
-          </a:prstGeom>
-        </p:spPr>
-        <p:style>
-          <a:lnRef idx="2">
-            <a:schemeClr val="accent1">
-              <a:shade val="50000"/>
-            </a:schemeClr>
-          </a:lnRef>
-          <a:fillRef idx="1">
-            <a:schemeClr val="accent1"/>
-          </a:fillRef>
-          <a:effectRef idx="0">
-            <a:schemeClr val="accent1"/>
-          </a:effectRef>
-          <a:fontRef idx="minor">
-            <a:schemeClr val="lt1"/>
-          </a:fontRef>
-        </p:style>
-        <p:txBody>
-          <a:bodyPr lIns="91440" tIns="45720" rIns="91440" bIns="45720" rtlCol="0" anchor="ctr"/>
-          <a:lstStyle/>
-          <a:p>
-            <a:pPr algn="ctr"/>
-            <a:r>
-              <a:rPr lang="ru-RU" sz="3200" b="1" dirty="0">
-                <a:ln w="12700" cmpd="sng">
-                  <a:solidFill>
-                    <a:srgbClr val="FFC000"/>
-                  </a:solidFill>
-                  <a:prstDash val="solid"/>
-                </a:ln>
-                <a:solidFill>
-                  <a:srgbClr val="FFC000"/>
-                </a:solidFill>
-                <a:cs typeface="Calibri"/>
-              </a:rPr>
-              <a:t>Классы</a:t>
-            </a:r>
-            <a:endParaRPr lang="en-US" dirty="0"/>
-          </a:p>
-        </p:txBody>
-      </p:sp>
-      <p:pic>
-        <p:nvPicPr>
-          <p:cNvPr id="4" name="Picture 4">
-            <a:extLst>
-              <a:ext uri="{FF2B5EF4-FFF2-40B4-BE49-F238E27FC236}">
-                <a16:creationId xmlns:a16="http://schemas.microsoft.com/office/drawing/2014/main" id="{44005083-829B-40A0-A2E4-0FE4F8C6AEF0}"/>
-              </a:ext>
-            </a:extLst>
-          </p:cNvPr>
-          <p:cNvPicPr>
-            <a:picLocks noChangeAspect="1"/>
-          </p:cNvPicPr>
-          <p:nvPr/>
-        </p:nvPicPr>
-        <p:blipFill rotWithShape="1">
-          <a:blip r:embed="rId2"/>
-          <a:srcRect t="4098" b="13115"/>
-          <a:stretch/>
-        </p:blipFill>
-        <p:spPr>
-          <a:xfrm>
-            <a:off x="740656" y="2064389"/>
-            <a:ext cx="6035430" cy="1977796"/>
-          </a:xfrm>
-          <a:prstGeom prst="rect">
-            <a:avLst/>
-          </a:prstGeom>
-        </p:spPr>
-      </p:pic>
-      <p:sp>
-        <p:nvSpPr>
-          <p:cNvPr id="5" name="TextBox 4">
-            <a:extLst>
-              <a:ext uri="{FF2B5EF4-FFF2-40B4-BE49-F238E27FC236}">
-                <a16:creationId xmlns:a16="http://schemas.microsoft.com/office/drawing/2014/main" id="{F843A384-8EAD-4D5A-9A25-85E13DC09C7E}"/>
-              </a:ext>
-            </a:extLst>
-          </p:cNvPr>
-          <p:cNvSpPr txBox="1"/>
-          <p:nvPr/>
-        </p:nvSpPr>
-        <p:spPr>
-          <a:xfrm>
-            <a:off x="201246" y="1481015"/>
-            <a:ext cx="3300045" cy="369332"/>
-          </a:xfrm>
-          <a:prstGeom prst="rect">
-            <a:avLst/>
-          </a:prstGeom>
-          <a:noFill/>
-        </p:spPr>
-        <p:txBody>
-          <a:bodyPr rot="0" spcFirstLastPara="0" vertOverflow="overflow" horzOverflow="overflow" vert="horz" wrap="square" lIns="91440" tIns="45720" rIns="91440" bIns="45720" numCol="1" spcCol="0" rtlCol="0" fromWordArt="0" anchor="t" anchorCtr="0" forceAA="0" compatLnSpc="1">
-            <a:prstTxWarp prst="textNoShape">
-              <a:avLst/>
-            </a:prstTxWarp>
-            <a:spAutoFit/>
-          </a:bodyPr>
-          <a:lstStyle/>
-          <a:p>
-            <a:r>
-              <a:rPr lang="en-US" b="1" dirty="0" err="1"/>
-              <a:t>Пример</a:t>
-            </a:r>
-            <a:r>
-              <a:rPr lang="en-US" b="1" dirty="0"/>
-              <a:t> </a:t>
-            </a:r>
-            <a:r>
-              <a:rPr lang="en-US" b="1" dirty="0" err="1"/>
-              <a:t>простейшего</a:t>
-            </a:r>
-            <a:r>
-              <a:rPr lang="en-US" b="1" dirty="0"/>
-              <a:t> </a:t>
-            </a:r>
-            <a:r>
-              <a:rPr lang="en-US" b="1" dirty="0" err="1"/>
-              <a:t>класса</a:t>
-            </a:r>
-            <a:r>
-              <a:rPr lang="en-US" b="1" dirty="0"/>
-              <a:t>:</a:t>
-            </a:r>
-            <a:endParaRPr lang="en-US" b="1" dirty="0">
-              <a:cs typeface="Calibri"/>
-            </a:endParaRPr>
-          </a:p>
-        </p:txBody>
-      </p:sp>
-      <p:pic>
-        <p:nvPicPr>
-          <p:cNvPr id="7" name="Picture 12">
-            <a:extLst>
-              <a:ext uri="{FF2B5EF4-FFF2-40B4-BE49-F238E27FC236}">
-                <a16:creationId xmlns:a16="http://schemas.microsoft.com/office/drawing/2014/main" id="{48FF6F82-BCA5-4CE7-B755-B7118C572EE5}"/>
-              </a:ext>
-            </a:extLst>
-          </p:cNvPr>
-          <p:cNvPicPr>
-            <a:picLocks noChangeAspect="1"/>
-          </p:cNvPicPr>
-          <p:nvPr/>
-        </p:nvPicPr>
-        <p:blipFill>
-          <a:blip r:embed="rId3"/>
-          <a:stretch>
-            <a:fillRect/>
-          </a:stretch>
-        </p:blipFill>
-        <p:spPr>
-          <a:xfrm>
-            <a:off x="709246" y="5492288"/>
-            <a:ext cx="4677507" cy="562654"/>
-          </a:xfrm>
-          <a:prstGeom prst="rect">
-            <a:avLst/>
-          </a:prstGeom>
-        </p:spPr>
-      </p:pic>
-      <p:sp>
-        <p:nvSpPr>
-          <p:cNvPr id="17" name="TextBox 16">
-            <a:extLst>
-              <a:ext uri="{FF2B5EF4-FFF2-40B4-BE49-F238E27FC236}">
-                <a16:creationId xmlns:a16="http://schemas.microsoft.com/office/drawing/2014/main" id="{6216394E-6FDB-4755-AD4D-B52D336B0461}"/>
-              </a:ext>
-            </a:extLst>
-          </p:cNvPr>
-          <p:cNvSpPr txBox="1"/>
-          <p:nvPr/>
-        </p:nvSpPr>
-        <p:spPr>
-          <a:xfrm>
-            <a:off x="201246" y="4910015"/>
-            <a:ext cx="3300045" cy="369332"/>
-          </a:xfrm>
-          <a:prstGeom prst="rect">
-            <a:avLst/>
-          </a:prstGeom>
-          <a:noFill/>
-        </p:spPr>
-        <p:txBody>
-          <a:bodyPr rot="0" spcFirstLastPara="0" vertOverflow="overflow" horzOverflow="overflow" vert="horz" wrap="square" lIns="91440" tIns="45720" rIns="91440" bIns="45720" numCol="1" spcCol="0" rtlCol="0" fromWordArt="0" anchor="t" anchorCtr="0" forceAA="0" compatLnSpc="1">
-            <a:prstTxWarp prst="textNoShape">
-              <a:avLst/>
-            </a:prstTxWarp>
-            <a:spAutoFit/>
-          </a:bodyPr>
-          <a:lstStyle/>
-          <a:p>
-            <a:r>
-              <a:rPr lang="en-US" b="1" dirty="0" err="1"/>
-              <a:t>Вывод</a:t>
-            </a:r>
-            <a:r>
-              <a:rPr lang="en-US" b="1" dirty="0"/>
-              <a:t>:</a:t>
-            </a:r>
-            <a:endParaRPr lang="en-US" dirty="0"/>
-          </a:p>
-        </p:txBody>
-      </p:sp>
-      <p:sp>
-        <p:nvSpPr>
-          <p:cNvPr id="18" name="Rectangle: Rounded Corners 17">
-            <a:extLst>
-              <a:ext uri="{FF2B5EF4-FFF2-40B4-BE49-F238E27FC236}">
-                <a16:creationId xmlns:a16="http://schemas.microsoft.com/office/drawing/2014/main" id="{A102A3DD-933B-43FA-B3D3-02F140C96CDE}"/>
-              </a:ext>
-            </a:extLst>
-          </p:cNvPr>
-          <p:cNvSpPr/>
-          <p:nvPr/>
-        </p:nvSpPr>
-        <p:spPr>
-          <a:xfrm>
-            <a:off x="6541941" y="4798196"/>
-            <a:ext cx="4988366" cy="1133230"/>
-          </a:xfrm>
-          <a:prstGeom prst="roundRect">
-            <a:avLst/>
-          </a:prstGeom>
-        </p:spPr>
-        <p:style>
-          <a:lnRef idx="2">
-            <a:schemeClr val="accent1">
-              <a:shade val="50000"/>
-            </a:schemeClr>
-          </a:lnRef>
-          <a:fillRef idx="1">
-            <a:schemeClr val="accent1"/>
-          </a:fillRef>
-          <a:effectRef idx="0">
-            <a:schemeClr val="accent1"/>
-          </a:effectRef>
-          <a:fontRef idx="minor">
-            <a:schemeClr val="lt1"/>
-          </a:fontRef>
-        </p:style>
-        <p:txBody>
-          <a:bodyPr rtlCol="0" anchor="ctr"/>
-          <a:lstStyle/>
-          <a:p>
-            <a:r>
-              <a:rPr lang="en-US" dirty="0" err="1">
-                <a:ea typeface="+mn-lt"/>
-                <a:cs typeface="+mn-lt"/>
-              </a:rPr>
-              <a:t>Класс</a:t>
-            </a:r>
-            <a:r>
-              <a:rPr lang="en-US" dirty="0">
-                <a:ea typeface="+mn-lt"/>
-                <a:cs typeface="+mn-lt"/>
-              </a:rPr>
-              <a:t> </a:t>
-            </a:r>
-            <a:r>
-              <a:rPr lang="en-US" dirty="0" err="1">
-                <a:ea typeface="+mn-lt"/>
-                <a:cs typeface="+mn-lt"/>
-              </a:rPr>
-              <a:t>можно</a:t>
-            </a:r>
-            <a:r>
-              <a:rPr lang="en-US" dirty="0">
-                <a:ea typeface="+mn-lt"/>
-                <a:cs typeface="+mn-lt"/>
-              </a:rPr>
-              <a:t> </a:t>
-            </a:r>
-            <a:r>
-              <a:rPr lang="en-US" dirty="0" err="1">
-                <a:ea typeface="+mn-lt"/>
-                <a:cs typeface="+mn-lt"/>
-              </a:rPr>
-              <a:t>сравнить</a:t>
-            </a:r>
-            <a:r>
-              <a:rPr lang="en-US" dirty="0">
-                <a:ea typeface="+mn-lt"/>
-                <a:cs typeface="+mn-lt"/>
-              </a:rPr>
-              <a:t> с </a:t>
-            </a:r>
-            <a:r>
-              <a:rPr lang="en-US" dirty="0" err="1">
-                <a:ea typeface="+mn-lt"/>
-                <a:cs typeface="+mn-lt"/>
-              </a:rPr>
-              <a:t>чертежом</a:t>
-            </a:r>
-            <a:r>
-              <a:rPr lang="en-US" dirty="0">
-                <a:ea typeface="+mn-lt"/>
-                <a:cs typeface="+mn-lt"/>
-              </a:rPr>
-              <a:t>, </a:t>
-            </a:r>
-            <a:r>
-              <a:rPr lang="en-US" dirty="0" err="1">
-                <a:ea typeface="+mn-lt"/>
-                <a:cs typeface="+mn-lt"/>
-              </a:rPr>
-              <a:t>по</a:t>
-            </a:r>
-            <a:r>
-              <a:rPr lang="en-US" dirty="0">
-                <a:ea typeface="+mn-lt"/>
-                <a:cs typeface="+mn-lt"/>
-              </a:rPr>
-              <a:t> </a:t>
-            </a:r>
-            <a:r>
-              <a:rPr lang="en-US" dirty="0" err="1">
-                <a:ea typeface="+mn-lt"/>
-                <a:cs typeface="+mn-lt"/>
-              </a:rPr>
-              <a:t>которому</a:t>
-            </a:r>
-            <a:r>
-              <a:rPr lang="en-US" dirty="0">
-                <a:ea typeface="+mn-lt"/>
-                <a:cs typeface="+mn-lt"/>
-              </a:rPr>
-              <a:t> </a:t>
-            </a:r>
-            <a:r>
-              <a:rPr lang="en-US" dirty="0" err="1">
-                <a:ea typeface="+mn-lt"/>
-                <a:cs typeface="+mn-lt"/>
-              </a:rPr>
-              <a:t>создаются</a:t>
-            </a:r>
-            <a:r>
-              <a:rPr lang="en-US" dirty="0">
-                <a:ea typeface="+mn-lt"/>
-                <a:cs typeface="+mn-lt"/>
-              </a:rPr>
-              <a:t> </a:t>
-            </a:r>
-            <a:r>
-              <a:rPr lang="en-US" dirty="0" err="1">
-                <a:ea typeface="+mn-lt"/>
-                <a:cs typeface="+mn-lt"/>
-              </a:rPr>
-              <a:t>объекты</a:t>
-            </a:r>
-            <a:r>
-              <a:rPr lang="en-US" dirty="0">
-                <a:ea typeface="+mn-lt"/>
-                <a:cs typeface="+mn-lt"/>
-              </a:rPr>
-              <a:t>.</a:t>
-            </a:r>
-            <a:endParaRPr lang="en-US">
-              <a:cs typeface="Calibri"/>
-            </a:endParaRPr>
-          </a:p>
-        </p:txBody>
-      </p:sp>
-      <p:sp>
-        <p:nvSpPr>
-          <p:cNvPr id="20" name="Rectangle: Rounded Corners 19">
-            <a:extLst>
-              <a:ext uri="{FF2B5EF4-FFF2-40B4-BE49-F238E27FC236}">
-                <a16:creationId xmlns:a16="http://schemas.microsoft.com/office/drawing/2014/main" id="{D097D810-C6D7-4012-84BB-36E86B8FD46C}"/>
-              </a:ext>
-            </a:extLst>
-          </p:cNvPr>
-          <p:cNvSpPr/>
-          <p:nvPr/>
-        </p:nvSpPr>
-        <p:spPr>
-          <a:xfrm>
-            <a:off x="6242930" y="1431892"/>
-            <a:ext cx="5460996" cy="930672"/>
-          </a:xfrm>
-          <a:prstGeom prst="roundRect">
-            <a:avLst/>
-          </a:prstGeom>
-        </p:spPr>
-        <p:style>
-          <a:lnRef idx="2">
-            <a:schemeClr val="accent1">
-              <a:shade val="50000"/>
-            </a:schemeClr>
-          </a:lnRef>
-          <a:fillRef idx="1">
-            <a:schemeClr val="accent1"/>
-          </a:fillRef>
-          <a:effectRef idx="0">
-            <a:schemeClr val="accent1"/>
-          </a:effectRef>
-          <a:fontRef idx="minor">
-            <a:schemeClr val="lt1"/>
-          </a:fontRef>
-        </p:style>
-        <p:txBody>
-          <a:bodyPr lIns="91440" tIns="45720" rIns="91440" bIns="45720" rtlCol="0" anchor="ctr"/>
-          <a:lstStyle/>
-          <a:p>
-            <a:r>
-              <a:rPr lang="en-US" b="1" dirty="0" err="1">
-                <a:solidFill>
-                  <a:srgbClr val="FFC000"/>
-                </a:solidFill>
-                <a:ea typeface="+mn-lt"/>
-                <a:cs typeface="+mn-lt"/>
-              </a:rPr>
-              <a:t>Класс</a:t>
-            </a:r>
-            <a:r>
-              <a:rPr lang="en-US" dirty="0">
-                <a:solidFill>
-                  <a:srgbClr val="FFC000"/>
-                </a:solidFill>
-                <a:ea typeface="+mn-lt"/>
-                <a:cs typeface="+mn-lt"/>
-              </a:rPr>
-              <a:t> - </a:t>
-            </a:r>
-            <a:r>
-              <a:rPr lang="en-US" dirty="0" err="1">
-                <a:solidFill>
-                  <a:srgbClr val="FFFFFF"/>
-                </a:solidFill>
-                <a:ea typeface="+mn-lt"/>
-                <a:cs typeface="+mn-lt"/>
-              </a:rPr>
-              <a:t>это</a:t>
-            </a:r>
-            <a:r>
-              <a:rPr lang="en-US" dirty="0">
-                <a:solidFill>
-                  <a:srgbClr val="FFFFFF"/>
-                </a:solidFill>
-                <a:ea typeface="+mn-lt"/>
-                <a:cs typeface="+mn-lt"/>
-              </a:rPr>
-              <a:t> </a:t>
-            </a:r>
-            <a:r>
-              <a:rPr lang="en-US" dirty="0" err="1">
-                <a:solidFill>
-                  <a:srgbClr val="FFFFFF"/>
-                </a:solidFill>
-                <a:ea typeface="+mn-lt"/>
-                <a:cs typeface="+mn-lt"/>
-              </a:rPr>
-              <a:t>тип</a:t>
-            </a:r>
-            <a:r>
-              <a:rPr lang="en-US" dirty="0">
-                <a:ea typeface="+mn-lt"/>
-                <a:cs typeface="+mn-lt"/>
-              </a:rPr>
-              <a:t>, </a:t>
-            </a:r>
-            <a:r>
-              <a:rPr lang="en-US" dirty="0" err="1">
-                <a:ea typeface="+mn-lt"/>
-                <a:cs typeface="+mn-lt"/>
-              </a:rPr>
-              <a:t>описывающий</a:t>
-            </a:r>
-            <a:r>
-              <a:rPr lang="en-US" dirty="0">
-                <a:ea typeface="+mn-lt"/>
-                <a:cs typeface="+mn-lt"/>
-              </a:rPr>
-              <a:t> </a:t>
-            </a:r>
-            <a:r>
-              <a:rPr lang="en-US" dirty="0" err="1">
-                <a:ea typeface="+mn-lt"/>
-                <a:cs typeface="+mn-lt"/>
-              </a:rPr>
-              <a:t>устройство</a:t>
-            </a:r>
-            <a:r>
-              <a:rPr lang="en-US" dirty="0">
-                <a:ea typeface="+mn-lt"/>
-                <a:cs typeface="+mn-lt"/>
-              </a:rPr>
-              <a:t> </a:t>
-            </a:r>
-            <a:r>
-              <a:rPr lang="en-US" dirty="0" err="1">
-                <a:ea typeface="+mn-lt"/>
-                <a:cs typeface="+mn-lt"/>
-              </a:rPr>
-              <a:t>объектов</a:t>
-            </a:r>
-            <a:r>
-              <a:rPr lang="en-US" dirty="0">
-                <a:ea typeface="+mn-lt"/>
-                <a:cs typeface="+mn-lt"/>
-              </a:rPr>
-              <a:t>.  </a:t>
-            </a:r>
-            <a:endParaRPr lang="en-US" dirty="0">
-              <a:cs typeface="Calibri" panose="020F0502020204030204"/>
-            </a:endParaRPr>
-          </a:p>
-        </p:txBody>
-      </p:sp>
-      <p:sp>
-        <p:nvSpPr>
-          <p:cNvPr id="22" name="Rectangle: Rounded Corners 21">
-            <a:extLst>
-              <a:ext uri="{FF2B5EF4-FFF2-40B4-BE49-F238E27FC236}">
-                <a16:creationId xmlns:a16="http://schemas.microsoft.com/office/drawing/2014/main" id="{942A2D75-B235-431C-A9E6-2144F0F60083}"/>
-              </a:ext>
-            </a:extLst>
-          </p:cNvPr>
-          <p:cNvSpPr/>
-          <p:nvPr/>
-        </p:nvSpPr>
-        <p:spPr>
-          <a:xfrm>
-            <a:off x="7303941" y="2975181"/>
-            <a:ext cx="3821252" cy="641306"/>
-          </a:xfrm>
-          <a:prstGeom prst="roundRect">
-            <a:avLst/>
-          </a:prstGeom>
-        </p:spPr>
-        <p:style>
-          <a:lnRef idx="2">
-            <a:schemeClr val="accent1">
-              <a:shade val="50000"/>
-            </a:schemeClr>
-          </a:lnRef>
-          <a:fillRef idx="1">
-            <a:schemeClr val="accent1"/>
-          </a:fillRef>
-          <a:effectRef idx="0">
-            <a:schemeClr val="accent1"/>
-          </a:effectRef>
-          <a:fontRef idx="minor">
-            <a:schemeClr val="lt1"/>
-          </a:fontRef>
-        </p:style>
-        <p:txBody>
-          <a:bodyPr lIns="91440" tIns="45720" rIns="91440" bIns="45720" rtlCol="0" anchor="ctr"/>
-          <a:lstStyle/>
-          <a:p>
-            <a:pPr algn="ctr"/>
-            <a:r>
-              <a:rPr lang="en-US" b="1" dirty="0">
-                <a:solidFill>
-                  <a:srgbClr val="FFC000"/>
-                </a:solidFill>
-                <a:ea typeface="+mn-lt"/>
-                <a:cs typeface="+mn-lt"/>
-              </a:rPr>
-              <a:t>   </a:t>
-            </a:r>
-            <a:r>
-              <a:rPr lang="en-US" b="1" dirty="0" err="1">
-                <a:solidFill>
-                  <a:srgbClr val="FFC000"/>
-                </a:solidFill>
-                <a:ea typeface="+mn-lt"/>
-                <a:cs typeface="+mn-lt"/>
-              </a:rPr>
-              <a:t>Объект</a:t>
-            </a:r>
-            <a:r>
-              <a:rPr lang="en-US" dirty="0">
-                <a:solidFill>
-                  <a:srgbClr val="FFC000"/>
-                </a:solidFill>
-                <a:ea typeface="+mn-lt"/>
-                <a:cs typeface="+mn-lt"/>
-              </a:rPr>
-              <a:t> </a:t>
-            </a:r>
-            <a:r>
-              <a:rPr lang="en-US" dirty="0">
-                <a:ea typeface="+mn-lt"/>
-                <a:cs typeface="+mn-lt"/>
-              </a:rPr>
-              <a:t>— </a:t>
-            </a:r>
-            <a:r>
-              <a:rPr lang="en-US" dirty="0" err="1">
-                <a:ea typeface="+mn-lt"/>
-                <a:cs typeface="+mn-lt"/>
-              </a:rPr>
-              <a:t>это</a:t>
-            </a:r>
-            <a:r>
-              <a:rPr lang="en-US" dirty="0">
-                <a:ea typeface="+mn-lt"/>
-                <a:cs typeface="+mn-lt"/>
-              </a:rPr>
-              <a:t> </a:t>
-            </a:r>
-            <a:r>
-              <a:rPr lang="en-US" dirty="0" err="1">
-                <a:ea typeface="+mn-lt"/>
-                <a:cs typeface="+mn-lt"/>
-              </a:rPr>
-              <a:t>экземпляр</a:t>
-            </a:r>
-            <a:r>
-              <a:rPr lang="en-US" dirty="0">
-                <a:ea typeface="+mn-lt"/>
-                <a:cs typeface="+mn-lt"/>
-              </a:rPr>
-              <a:t> </a:t>
-            </a:r>
-            <a:r>
-              <a:rPr lang="en-US" dirty="0" err="1">
-                <a:ea typeface="+mn-lt"/>
-                <a:cs typeface="+mn-lt"/>
-              </a:rPr>
-              <a:t>класса</a:t>
-            </a:r>
-            <a:r>
-              <a:rPr lang="en-US" dirty="0">
-                <a:ea typeface="+mn-lt"/>
-                <a:cs typeface="+mn-lt"/>
-              </a:rPr>
-              <a:t>.  </a:t>
-            </a:r>
-            <a:endParaRPr lang="en-US" dirty="0"/>
-          </a:p>
-        </p:txBody>
-      </p:sp>
-      <p:sp>
-        <p:nvSpPr>
-          <p:cNvPr id="23" name="Arrow: Down 22">
-            <a:extLst>
-              <a:ext uri="{FF2B5EF4-FFF2-40B4-BE49-F238E27FC236}">
-                <a16:creationId xmlns:a16="http://schemas.microsoft.com/office/drawing/2014/main" id="{75887914-9D4B-4923-9506-A72E714EAD9A}"/>
-              </a:ext>
-            </a:extLst>
-          </p:cNvPr>
-          <p:cNvSpPr/>
-          <p:nvPr/>
-        </p:nvSpPr>
-        <p:spPr>
-          <a:xfrm>
-            <a:off x="9007784" y="2476808"/>
-            <a:ext cx="318305" cy="453342"/>
-          </a:xfrm>
-          <a:prstGeom prst="downArrow">
-            <a:avLst/>
-          </a:prstGeom>
-          <a:solidFill>
-            <a:schemeClr val="accent4"/>
-          </a:solidFill>
-          <a:ln>
-            <a:noFill/>
-          </a:ln>
-        </p:spPr>
-        <p:style>
-          <a:lnRef idx="2">
-            <a:schemeClr val="accent1">
-              <a:shade val="50000"/>
-            </a:schemeClr>
-          </a:lnRef>
-          <a:fillRef idx="1">
-            <a:schemeClr val="accent1"/>
-          </a:fillRef>
-          <a:effectRef idx="0">
-            <a:schemeClr val="accent1"/>
-          </a:effectRef>
-          <a:fontRef idx="minor">
-            <a:schemeClr val="lt1"/>
-          </a:fontRef>
-        </p:style>
-        <p:txBody>
-          <a:bodyPr rtlCol="0" anchor="ctr"/>
-          <a:lstStyle/>
-          <a:p>
-            <a:pPr algn="ctr"/>
-            <a:endParaRPr lang="en-US">
-              <a:solidFill>
-                <a:srgbClr val="FFC000"/>
-              </a:solidFill>
-            </a:endParaRPr>
-          </a:p>
-        </p:txBody>
-      </p:sp>
-    </p:spTree>
-    <p:extLst>
-      <p:ext uri="{BB962C8B-B14F-4D97-AF65-F5344CB8AC3E}">
-        <p14:creationId xmlns:p14="http://schemas.microsoft.com/office/powerpoint/2010/main" val="2236230769"/>
-      </p:ext>
-    </p:extLst>
-  </p:cSld>
-  <p:clrMapOvr>
-    <a:masterClrMapping/>
-  </p:clrMapOvr>
-</p:sld>
-</file>
-
-<file path=ppt/slides/slide16.xml><?xml version="1.0" encoding="utf-8"?>
 <p:sld xmlns:a="http://schemas.openxmlformats.org/drawingml/2006/main" xmlns:r="http://schemas.openxmlformats.org/officeDocument/2006/relationships" xmlns:p="http://schemas.openxmlformats.org/presentationml/2006/main">
   <p:cSld>
     <p:spTree>

</xml_diff>